<commit_message>
MCQs of OS is uploaded
</commit_message>
<xml_diff>
--- a/os/Final/6-MESyn-part1-31052023-035135pm.pptx
+++ b/os/Final/6-MESyn-part1-31052023-035135pm.pptx
@@ -5,7 +5,7 @@
     <p:sldMasterId id="2147483648" r:id="rId1"/>
   </p:sldMasterIdLst>
   <p:notesMasterIdLst>
-    <p:notesMasterId r:id="rId21"/>
+    <p:notesMasterId r:id="rId22"/>
   </p:notesMasterIdLst>
   <p:sldIdLst>
     <p:sldId id="256" r:id="rId2"/>
@@ -13,20 +13,21 @@
     <p:sldId id="275" r:id="rId4"/>
     <p:sldId id="276" r:id="rId5"/>
     <p:sldId id="277" r:id="rId6"/>
-    <p:sldId id="278" r:id="rId7"/>
-    <p:sldId id="279" r:id="rId8"/>
-    <p:sldId id="282" r:id="rId9"/>
-    <p:sldId id="283" r:id="rId10"/>
-    <p:sldId id="284" r:id="rId11"/>
-    <p:sldId id="285" r:id="rId12"/>
-    <p:sldId id="286" r:id="rId13"/>
-    <p:sldId id="288" r:id="rId14"/>
-    <p:sldId id="289" r:id="rId15"/>
-    <p:sldId id="291" r:id="rId16"/>
-    <p:sldId id="292" r:id="rId17"/>
-    <p:sldId id="293" r:id="rId18"/>
-    <p:sldId id="287" r:id="rId19"/>
-    <p:sldId id="273" r:id="rId20"/>
+    <p:sldId id="294" r:id="rId7"/>
+    <p:sldId id="278" r:id="rId8"/>
+    <p:sldId id="279" r:id="rId9"/>
+    <p:sldId id="282" r:id="rId10"/>
+    <p:sldId id="283" r:id="rId11"/>
+    <p:sldId id="284" r:id="rId12"/>
+    <p:sldId id="285" r:id="rId13"/>
+    <p:sldId id="286" r:id="rId14"/>
+    <p:sldId id="288" r:id="rId15"/>
+    <p:sldId id="289" r:id="rId16"/>
+    <p:sldId id="291" r:id="rId17"/>
+    <p:sldId id="292" r:id="rId18"/>
+    <p:sldId id="293" r:id="rId19"/>
+    <p:sldId id="287" r:id="rId20"/>
+    <p:sldId id="273" r:id="rId21"/>
   </p:sldIdLst>
   <p:sldSz cx="12192000" cy="6858000"/>
   <p:notesSz cx="6858000" cy="9144000"/>
@@ -226,7 +227,7 @@
           <a:p>
             <a:fld id="{0C24BFAF-5F38-467D-AFF1-45D197BF21B6}" type="datetimeFigureOut">
               <a:rPr lang="en-US" smtClean="0"/>
-              <a:t>2023-05-31</a:t>
+              <a:t>6/26/2023</a:t>
             </a:fld>
             <a:endParaRPr lang="en-US"/>
           </a:p>
@@ -290,38 +291,37 @@
           <a:p>
             <a:pPr lvl="0"/>
             <a:r>
-              <a:rPr lang="en-US" smtClean="0"/>
+              <a:rPr lang="en-US"/>
               <a:t>Click to edit Master text styles</a:t>
             </a:r>
           </a:p>
           <a:p>
             <a:pPr lvl="1"/>
             <a:r>
-              <a:rPr lang="en-US" smtClean="0"/>
+              <a:rPr lang="en-US"/>
               <a:t>Second level</a:t>
             </a:r>
           </a:p>
           <a:p>
             <a:pPr lvl="2"/>
             <a:r>
-              <a:rPr lang="en-US" smtClean="0"/>
+              <a:rPr lang="en-US"/>
               <a:t>Third level</a:t>
             </a:r>
           </a:p>
           <a:p>
             <a:pPr lvl="3"/>
             <a:r>
-              <a:rPr lang="en-US" smtClean="0"/>
+              <a:rPr lang="en-US"/>
               <a:t>Fourth level</a:t>
             </a:r>
           </a:p>
           <a:p>
             <a:pPr lvl="4"/>
             <a:r>
-              <a:rPr lang="en-US" smtClean="0"/>
+              <a:rPr lang="en-US"/>
               <a:t>Fifth level</a:t>
             </a:r>
-            <a:endParaRPr lang="en-US"/>
           </a:p>
         </p:txBody>
       </p:sp>
@@ -578,6 +578,174 @@
 </p:notes>
 </file>
 
+<file path=ppt/notesSlides/notesSlide2.xml><?xml version="1.0" encoding="utf-8"?>
+<p:notes xmlns:a="http://schemas.openxmlformats.org/drawingml/2006/main" xmlns:r="http://schemas.openxmlformats.org/officeDocument/2006/relationships" xmlns:p="http://schemas.openxmlformats.org/presentationml/2006/main">
+  <p:cSld>
+    <p:spTree>
+      <p:nvGrpSpPr>
+        <p:cNvPr id="1" name=""/>
+        <p:cNvGrpSpPr/>
+        <p:nvPr/>
+      </p:nvGrpSpPr>
+      <p:grpSpPr>
+        <a:xfrm>
+          <a:off x="0" y="0"/>
+          <a:ext cx="0" cy="0"/>
+          <a:chOff x="0" y="0"/>
+          <a:chExt cx="0" cy="0"/>
+        </a:xfrm>
+      </p:grpSpPr>
+      <p:sp>
+        <p:nvSpPr>
+          <p:cNvPr id="2" name="Slide Image Placeholder 1"/>
+          <p:cNvSpPr>
+            <a:spLocks noGrp="1" noRot="1" noChangeAspect="1"/>
+          </p:cNvSpPr>
+          <p:nvPr>
+            <p:ph type="sldImg"/>
+          </p:nvPr>
+        </p:nvSpPr>
+        <p:spPr/>
+      </p:sp>
+      <p:sp>
+        <p:nvSpPr>
+          <p:cNvPr id="3" name="Notes Placeholder 2"/>
+          <p:cNvSpPr>
+            <a:spLocks noGrp="1"/>
+          </p:cNvSpPr>
+          <p:nvPr>
+            <p:ph type="body" idx="1"/>
+          </p:nvPr>
+        </p:nvSpPr>
+        <p:spPr/>
+        <p:txBody>
+          <a:bodyPr/>
+          <a:lstStyle/>
+          <a:p>
+            <a:endParaRPr lang="en-US" dirty="0"/>
+          </a:p>
+        </p:txBody>
+      </p:sp>
+      <p:sp>
+        <p:nvSpPr>
+          <p:cNvPr id="4" name="Slide Number Placeholder 3"/>
+          <p:cNvSpPr>
+            <a:spLocks noGrp="1"/>
+          </p:cNvSpPr>
+          <p:nvPr>
+            <p:ph type="sldNum" sz="quarter" idx="5"/>
+          </p:nvPr>
+        </p:nvSpPr>
+        <p:spPr/>
+        <p:txBody>
+          <a:bodyPr/>
+          <a:lstStyle/>
+          <a:p>
+            <a:fld id="{2B630458-D6CD-483D-A297-CB2BF6A22F6F}" type="slidenum">
+              <a:rPr lang="en-US" smtClean="0"/>
+              <a:t>5</a:t>
+            </a:fld>
+            <a:endParaRPr lang="en-US"/>
+          </a:p>
+        </p:txBody>
+      </p:sp>
+    </p:spTree>
+    <p:extLst>
+      <p:ext uri="{BB962C8B-B14F-4D97-AF65-F5344CB8AC3E}">
+        <p14:creationId xmlns:p14="http://schemas.microsoft.com/office/powerpoint/2010/main" val="2937668434"/>
+      </p:ext>
+    </p:extLst>
+  </p:cSld>
+  <p:clrMapOvr>
+    <a:masterClrMapping/>
+  </p:clrMapOvr>
+</p:notes>
+</file>
+
+<file path=ppt/notesSlides/notesSlide3.xml><?xml version="1.0" encoding="utf-8"?>
+<p:notes xmlns:a="http://schemas.openxmlformats.org/drawingml/2006/main" xmlns:r="http://schemas.openxmlformats.org/officeDocument/2006/relationships" xmlns:p="http://schemas.openxmlformats.org/presentationml/2006/main">
+  <p:cSld>
+    <p:spTree>
+      <p:nvGrpSpPr>
+        <p:cNvPr id="1" name=""/>
+        <p:cNvGrpSpPr/>
+        <p:nvPr/>
+      </p:nvGrpSpPr>
+      <p:grpSpPr>
+        <a:xfrm>
+          <a:off x="0" y="0"/>
+          <a:ext cx="0" cy="0"/>
+          <a:chOff x="0" y="0"/>
+          <a:chExt cx="0" cy="0"/>
+        </a:xfrm>
+      </p:grpSpPr>
+      <p:sp>
+        <p:nvSpPr>
+          <p:cNvPr id="2" name="Slide Image Placeholder 1"/>
+          <p:cNvSpPr>
+            <a:spLocks noGrp="1" noRot="1" noChangeAspect="1"/>
+          </p:cNvSpPr>
+          <p:nvPr>
+            <p:ph type="sldImg"/>
+          </p:nvPr>
+        </p:nvSpPr>
+        <p:spPr/>
+      </p:sp>
+      <p:sp>
+        <p:nvSpPr>
+          <p:cNvPr id="3" name="Notes Placeholder 2"/>
+          <p:cNvSpPr>
+            <a:spLocks noGrp="1"/>
+          </p:cNvSpPr>
+          <p:nvPr>
+            <p:ph type="body" idx="1"/>
+          </p:nvPr>
+        </p:nvSpPr>
+        <p:spPr/>
+        <p:txBody>
+          <a:bodyPr/>
+          <a:lstStyle/>
+          <a:p>
+            <a:endParaRPr lang="en-US" dirty="0"/>
+          </a:p>
+        </p:txBody>
+      </p:sp>
+      <p:sp>
+        <p:nvSpPr>
+          <p:cNvPr id="4" name="Slide Number Placeholder 3"/>
+          <p:cNvSpPr>
+            <a:spLocks noGrp="1"/>
+          </p:cNvSpPr>
+          <p:nvPr>
+            <p:ph type="sldNum" sz="quarter" idx="5"/>
+          </p:nvPr>
+        </p:nvSpPr>
+        <p:spPr/>
+        <p:txBody>
+          <a:bodyPr/>
+          <a:lstStyle/>
+          <a:p>
+            <a:fld id="{2B630458-D6CD-483D-A297-CB2BF6A22F6F}" type="slidenum">
+              <a:rPr lang="en-US" smtClean="0"/>
+              <a:t>11</a:t>
+            </a:fld>
+            <a:endParaRPr lang="en-US"/>
+          </a:p>
+        </p:txBody>
+      </p:sp>
+    </p:spTree>
+    <p:extLst>
+      <p:ext uri="{BB962C8B-B14F-4D97-AF65-F5344CB8AC3E}">
+        <p14:creationId xmlns:p14="http://schemas.microsoft.com/office/powerpoint/2010/main" val="558772947"/>
+      </p:ext>
+    </p:extLst>
+  </p:cSld>
+  <p:clrMapOvr>
+    <a:masterClrMapping/>
+  </p:clrMapOvr>
+</p:notes>
+</file>
+
 <file path=ppt/slideLayouts/slideLayout1.xml><?xml version="1.0" encoding="utf-8"?>
 <p:sldLayout xmlns:a="http://schemas.openxmlformats.org/drawingml/2006/main" xmlns:r="http://schemas.openxmlformats.org/officeDocument/2006/relationships" xmlns:p="http://schemas.openxmlformats.org/presentationml/2006/main" type="title" preserve="1">
   <p:cSld name="Title Slide">
@@ -620,10 +788,9 @@
           </a:lstStyle>
           <a:p>
             <a:r>
-              <a:rPr lang="en-US" dirty="0" smtClean="0"/>
+              <a:rPr lang="en-US" dirty="0"/>
               <a:t>Click to edit Master title style</a:t>
             </a:r>
-            <a:endParaRPr lang="en-US" dirty="0"/>
           </a:p>
         </p:txBody>
       </p:sp>
@@ -685,10 +852,9 @@
           </a:lstStyle>
           <a:p>
             <a:r>
-              <a:rPr lang="en-US" dirty="0" smtClean="0"/>
+              <a:rPr lang="en-US" dirty="0"/>
               <a:t>Click to edit Master subtitle style</a:t>
             </a:r>
-            <a:endParaRPr lang="en-US" dirty="0"/>
           </a:p>
         </p:txBody>
       </p:sp>
@@ -709,7 +875,7 @@
           <a:p>
             <a:fld id="{EB6C8F66-0191-4567-84E6-3E7B511B9BBD}" type="datetime1">
               <a:rPr lang="en-US" smtClean="0"/>
-              <a:t>2023-05-31</a:t>
+              <a:t>6/26/2023</a:t>
             </a:fld>
             <a:endParaRPr lang="en-US"/>
           </a:p>
@@ -803,10 +969,9 @@
           <a:lstStyle/>
           <a:p>
             <a:r>
-              <a:rPr lang="en-US" smtClean="0"/>
+              <a:rPr lang="en-US"/>
               <a:t>Click to edit Master title style</a:t>
             </a:r>
-            <a:endParaRPr lang="en-US"/>
           </a:p>
         </p:txBody>
       </p:sp>
@@ -827,38 +992,37 @@
           <a:p>
             <a:pPr lvl="0"/>
             <a:r>
-              <a:rPr lang="en-US" smtClean="0"/>
+              <a:rPr lang="en-US"/>
               <a:t>Click to edit Master text styles</a:t>
             </a:r>
           </a:p>
           <a:p>
             <a:pPr lvl="1"/>
             <a:r>
-              <a:rPr lang="en-US" smtClean="0"/>
+              <a:rPr lang="en-US"/>
               <a:t>Second level</a:t>
             </a:r>
           </a:p>
           <a:p>
             <a:pPr lvl="2"/>
             <a:r>
-              <a:rPr lang="en-US" smtClean="0"/>
+              <a:rPr lang="en-US"/>
               <a:t>Third level</a:t>
             </a:r>
           </a:p>
           <a:p>
             <a:pPr lvl="3"/>
             <a:r>
-              <a:rPr lang="en-US" smtClean="0"/>
+              <a:rPr lang="en-US"/>
               <a:t>Fourth level</a:t>
             </a:r>
           </a:p>
           <a:p>
             <a:pPr lvl="4"/>
             <a:r>
-              <a:rPr lang="en-US" smtClean="0"/>
+              <a:rPr lang="en-US"/>
               <a:t>Fifth level</a:t>
             </a:r>
-            <a:endParaRPr lang="en-US"/>
           </a:p>
         </p:txBody>
       </p:sp>
@@ -879,7 +1043,7 @@
           <a:p>
             <a:fld id="{00D955C9-83B5-47C1-B621-51EC075EC1B4}" type="datetime1">
               <a:rPr lang="en-US" smtClean="0"/>
-              <a:t>2023-05-31</a:t>
+              <a:t>6/26/2023</a:t>
             </a:fld>
             <a:endParaRPr lang="en-US"/>
           </a:p>
@@ -978,10 +1142,9 @@
           <a:lstStyle/>
           <a:p>
             <a:r>
-              <a:rPr lang="en-US" smtClean="0"/>
+              <a:rPr lang="en-US"/>
               <a:t>Click to edit Master title style</a:t>
             </a:r>
-            <a:endParaRPr lang="en-US"/>
           </a:p>
         </p:txBody>
       </p:sp>
@@ -1007,38 +1170,37 @@
           <a:p>
             <a:pPr lvl="0"/>
             <a:r>
-              <a:rPr lang="en-US" smtClean="0"/>
+              <a:rPr lang="en-US"/>
               <a:t>Click to edit Master text styles</a:t>
             </a:r>
           </a:p>
           <a:p>
             <a:pPr lvl="1"/>
             <a:r>
-              <a:rPr lang="en-US" smtClean="0"/>
+              <a:rPr lang="en-US"/>
               <a:t>Second level</a:t>
             </a:r>
           </a:p>
           <a:p>
             <a:pPr lvl="2"/>
             <a:r>
-              <a:rPr lang="en-US" smtClean="0"/>
+              <a:rPr lang="en-US"/>
               <a:t>Third level</a:t>
             </a:r>
           </a:p>
           <a:p>
             <a:pPr lvl="3"/>
             <a:r>
-              <a:rPr lang="en-US" smtClean="0"/>
+              <a:rPr lang="en-US"/>
               <a:t>Fourth level</a:t>
             </a:r>
           </a:p>
           <a:p>
             <a:pPr lvl="4"/>
             <a:r>
-              <a:rPr lang="en-US" smtClean="0"/>
+              <a:rPr lang="en-US"/>
               <a:t>Fifth level</a:t>
             </a:r>
-            <a:endParaRPr lang="en-US"/>
           </a:p>
         </p:txBody>
       </p:sp>
@@ -1059,7 +1221,7 @@
           <a:p>
             <a:fld id="{9D8820C6-9CEE-4807-A3C7-C66F6AC7EA78}" type="datetime1">
               <a:rPr lang="en-US" smtClean="0"/>
-              <a:t>2023-05-31</a:t>
+              <a:t>6/26/2023</a:t>
             </a:fld>
             <a:endParaRPr lang="en-US"/>
           </a:p>
@@ -1153,10 +1315,9 @@
           <a:lstStyle/>
           <a:p>
             <a:r>
-              <a:rPr lang="en-US" smtClean="0"/>
+              <a:rPr lang="en-US"/>
               <a:t>Click to edit Master title style</a:t>
             </a:r>
-            <a:endParaRPr lang="en-US"/>
           </a:p>
         </p:txBody>
       </p:sp>
@@ -1177,38 +1338,37 @@
           <a:p>
             <a:pPr lvl="0"/>
             <a:r>
-              <a:rPr lang="en-US" smtClean="0"/>
+              <a:rPr lang="en-US"/>
               <a:t>Click to edit Master text styles</a:t>
             </a:r>
           </a:p>
           <a:p>
             <a:pPr lvl="1"/>
             <a:r>
-              <a:rPr lang="en-US" smtClean="0"/>
+              <a:rPr lang="en-US"/>
               <a:t>Second level</a:t>
             </a:r>
           </a:p>
           <a:p>
             <a:pPr lvl="2"/>
             <a:r>
-              <a:rPr lang="en-US" smtClean="0"/>
+              <a:rPr lang="en-US"/>
               <a:t>Third level</a:t>
             </a:r>
           </a:p>
           <a:p>
             <a:pPr lvl="3"/>
             <a:r>
-              <a:rPr lang="en-US" smtClean="0"/>
+              <a:rPr lang="en-US"/>
               <a:t>Fourth level</a:t>
             </a:r>
           </a:p>
           <a:p>
             <a:pPr lvl="4"/>
             <a:r>
-              <a:rPr lang="en-US" smtClean="0"/>
+              <a:rPr lang="en-US"/>
               <a:t>Fifth level</a:t>
             </a:r>
-            <a:endParaRPr lang="en-US"/>
           </a:p>
         </p:txBody>
       </p:sp>
@@ -1229,7 +1389,7 @@
           <a:p>
             <a:fld id="{1C45C56F-699A-4489-94C3-55C90372A7FA}" type="datetime1">
               <a:rPr lang="en-US" smtClean="0"/>
-              <a:t>2023-05-31</a:t>
+              <a:t>6/26/2023</a:t>
             </a:fld>
             <a:endParaRPr lang="en-US"/>
           </a:p>
@@ -1332,10 +1492,9 @@
           </a:lstStyle>
           <a:p>
             <a:r>
-              <a:rPr lang="en-US" smtClean="0"/>
+              <a:rPr lang="en-US"/>
               <a:t>Click to edit Master title style</a:t>
             </a:r>
-            <a:endParaRPr lang="en-US"/>
           </a:p>
         </p:txBody>
       </p:sp>
@@ -1452,7 +1611,7 @@
           <a:p>
             <a:pPr lvl="0"/>
             <a:r>
-              <a:rPr lang="en-US" smtClean="0"/>
+              <a:rPr lang="en-US"/>
               <a:t>Click to edit Master text styles</a:t>
             </a:r>
           </a:p>
@@ -1475,7 +1634,7 @@
           <a:p>
             <a:fld id="{7F4A0417-E3C6-4E9F-BE02-C9DA17FB75C6}" type="datetime1">
               <a:rPr lang="en-US" smtClean="0"/>
-              <a:t>2023-05-31</a:t>
+              <a:t>6/26/2023</a:t>
             </a:fld>
             <a:endParaRPr lang="en-US"/>
           </a:p>
@@ -1569,10 +1728,9 @@
           <a:lstStyle/>
           <a:p>
             <a:r>
-              <a:rPr lang="en-US" smtClean="0"/>
+              <a:rPr lang="en-US"/>
               <a:t>Click to edit Master title style</a:t>
             </a:r>
-            <a:endParaRPr lang="en-US"/>
           </a:p>
         </p:txBody>
       </p:sp>
@@ -1598,38 +1756,37 @@
           <a:p>
             <a:pPr lvl="0"/>
             <a:r>
-              <a:rPr lang="en-US" smtClean="0"/>
+              <a:rPr lang="en-US"/>
               <a:t>Click to edit Master text styles</a:t>
             </a:r>
           </a:p>
           <a:p>
             <a:pPr lvl="1"/>
             <a:r>
-              <a:rPr lang="en-US" smtClean="0"/>
+              <a:rPr lang="en-US"/>
               <a:t>Second level</a:t>
             </a:r>
           </a:p>
           <a:p>
             <a:pPr lvl="2"/>
             <a:r>
-              <a:rPr lang="en-US" smtClean="0"/>
+              <a:rPr lang="en-US"/>
               <a:t>Third level</a:t>
             </a:r>
           </a:p>
           <a:p>
             <a:pPr lvl="3"/>
             <a:r>
-              <a:rPr lang="en-US" smtClean="0"/>
+              <a:rPr lang="en-US"/>
               <a:t>Fourth level</a:t>
             </a:r>
           </a:p>
           <a:p>
             <a:pPr lvl="4"/>
             <a:r>
-              <a:rPr lang="en-US" smtClean="0"/>
+              <a:rPr lang="en-US"/>
               <a:t>Fifth level</a:t>
             </a:r>
-            <a:endParaRPr lang="en-US"/>
           </a:p>
         </p:txBody>
       </p:sp>
@@ -1655,38 +1812,37 @@
           <a:p>
             <a:pPr lvl="0"/>
             <a:r>
-              <a:rPr lang="en-US" smtClean="0"/>
+              <a:rPr lang="en-US"/>
               <a:t>Click to edit Master text styles</a:t>
             </a:r>
           </a:p>
           <a:p>
             <a:pPr lvl="1"/>
             <a:r>
-              <a:rPr lang="en-US" smtClean="0"/>
+              <a:rPr lang="en-US"/>
               <a:t>Second level</a:t>
             </a:r>
           </a:p>
           <a:p>
             <a:pPr lvl="2"/>
             <a:r>
-              <a:rPr lang="en-US" smtClean="0"/>
+              <a:rPr lang="en-US"/>
               <a:t>Third level</a:t>
             </a:r>
           </a:p>
           <a:p>
             <a:pPr lvl="3"/>
             <a:r>
-              <a:rPr lang="en-US" smtClean="0"/>
+              <a:rPr lang="en-US"/>
               <a:t>Fourth level</a:t>
             </a:r>
           </a:p>
           <a:p>
             <a:pPr lvl="4"/>
             <a:r>
-              <a:rPr lang="en-US" smtClean="0"/>
+              <a:rPr lang="en-US"/>
               <a:t>Fifth level</a:t>
             </a:r>
-            <a:endParaRPr lang="en-US"/>
           </a:p>
         </p:txBody>
       </p:sp>
@@ -1707,7 +1863,7 @@
           <a:p>
             <a:fld id="{82C888AD-63D6-40FE-8650-8DC7B3EE4280}" type="datetime1">
               <a:rPr lang="en-US" smtClean="0"/>
-              <a:t>2023-05-31</a:t>
+              <a:t>6/26/2023</a:t>
             </a:fld>
             <a:endParaRPr lang="en-US"/>
           </a:p>
@@ -1806,10 +1962,9 @@
           <a:lstStyle/>
           <a:p>
             <a:r>
-              <a:rPr lang="en-US" smtClean="0"/>
+              <a:rPr lang="en-US"/>
               <a:t>Click to edit Master title style</a:t>
             </a:r>
-            <a:endParaRPr lang="en-US"/>
           </a:p>
         </p:txBody>
       </p:sp>
@@ -1872,7 +2027,7 @@
           <a:p>
             <a:pPr lvl="0"/>
             <a:r>
-              <a:rPr lang="en-US" smtClean="0"/>
+              <a:rPr lang="en-US"/>
               <a:t>Click to edit Master text styles</a:t>
             </a:r>
           </a:p>
@@ -1900,38 +2055,37 @@
           <a:p>
             <a:pPr lvl="0"/>
             <a:r>
-              <a:rPr lang="en-US" smtClean="0"/>
+              <a:rPr lang="en-US"/>
               <a:t>Click to edit Master text styles</a:t>
             </a:r>
           </a:p>
           <a:p>
             <a:pPr lvl="1"/>
             <a:r>
-              <a:rPr lang="en-US" smtClean="0"/>
+              <a:rPr lang="en-US"/>
               <a:t>Second level</a:t>
             </a:r>
           </a:p>
           <a:p>
             <a:pPr lvl="2"/>
             <a:r>
-              <a:rPr lang="en-US" smtClean="0"/>
+              <a:rPr lang="en-US"/>
               <a:t>Third level</a:t>
             </a:r>
           </a:p>
           <a:p>
             <a:pPr lvl="3"/>
             <a:r>
-              <a:rPr lang="en-US" smtClean="0"/>
+              <a:rPr lang="en-US"/>
               <a:t>Fourth level</a:t>
             </a:r>
           </a:p>
           <a:p>
             <a:pPr lvl="4"/>
             <a:r>
-              <a:rPr lang="en-US" smtClean="0"/>
+              <a:rPr lang="en-US"/>
               <a:t>Fifth level</a:t>
             </a:r>
-            <a:endParaRPr lang="en-US"/>
           </a:p>
         </p:txBody>
       </p:sp>
@@ -1994,7 +2148,7 @@
           <a:p>
             <a:pPr lvl="0"/>
             <a:r>
-              <a:rPr lang="en-US" smtClean="0"/>
+              <a:rPr lang="en-US"/>
               <a:t>Click to edit Master text styles</a:t>
             </a:r>
           </a:p>
@@ -2022,38 +2176,37 @@
           <a:p>
             <a:pPr lvl="0"/>
             <a:r>
-              <a:rPr lang="en-US" smtClean="0"/>
+              <a:rPr lang="en-US"/>
               <a:t>Click to edit Master text styles</a:t>
             </a:r>
           </a:p>
           <a:p>
             <a:pPr lvl="1"/>
             <a:r>
-              <a:rPr lang="en-US" smtClean="0"/>
+              <a:rPr lang="en-US"/>
               <a:t>Second level</a:t>
             </a:r>
           </a:p>
           <a:p>
             <a:pPr lvl="2"/>
             <a:r>
-              <a:rPr lang="en-US" smtClean="0"/>
+              <a:rPr lang="en-US"/>
               <a:t>Third level</a:t>
             </a:r>
           </a:p>
           <a:p>
             <a:pPr lvl="3"/>
             <a:r>
-              <a:rPr lang="en-US" smtClean="0"/>
+              <a:rPr lang="en-US"/>
               <a:t>Fourth level</a:t>
             </a:r>
           </a:p>
           <a:p>
             <a:pPr lvl="4"/>
             <a:r>
-              <a:rPr lang="en-US" smtClean="0"/>
+              <a:rPr lang="en-US"/>
               <a:t>Fifth level</a:t>
             </a:r>
-            <a:endParaRPr lang="en-US"/>
           </a:p>
         </p:txBody>
       </p:sp>
@@ -2074,7 +2227,7 @@
           <a:p>
             <a:fld id="{C61284AB-2925-4A32-8F51-640C545B7590}" type="datetime1">
               <a:rPr lang="en-US" smtClean="0"/>
-              <a:t>2023-05-31</a:t>
+              <a:t>6/26/2023</a:t>
             </a:fld>
             <a:endParaRPr lang="en-US"/>
           </a:p>
@@ -2168,10 +2321,9 @@
           <a:lstStyle/>
           <a:p>
             <a:r>
-              <a:rPr lang="en-US" smtClean="0"/>
+              <a:rPr lang="en-US"/>
               <a:t>Click to edit Master title style</a:t>
             </a:r>
-            <a:endParaRPr lang="en-US"/>
           </a:p>
         </p:txBody>
       </p:sp>
@@ -2192,7 +2344,7 @@
           <a:p>
             <a:fld id="{40BC03CE-062E-4E21-8147-506ACBF62E17}" type="datetime1">
               <a:rPr lang="en-US" smtClean="0"/>
-              <a:t>2023-05-31</a:t>
+              <a:t>6/26/2023</a:t>
             </a:fld>
             <a:endParaRPr lang="en-US"/>
           </a:p>
@@ -2287,7 +2439,7 @@
           <a:p>
             <a:fld id="{1D29C6C2-30E9-466C-86A2-0F6BCD0D4FCA}" type="datetime1">
               <a:rPr lang="en-US" smtClean="0"/>
-              <a:t>2023-05-31</a:t>
+              <a:t>6/26/2023</a:t>
             </a:fld>
             <a:endParaRPr lang="en-US"/>
           </a:p>
@@ -2390,10 +2542,9 @@
           </a:lstStyle>
           <a:p>
             <a:r>
-              <a:rPr lang="en-US" smtClean="0"/>
+              <a:rPr lang="en-US"/>
               <a:t>Click to edit Master title style</a:t>
             </a:r>
-            <a:endParaRPr lang="en-US"/>
           </a:p>
         </p:txBody>
       </p:sp>
@@ -2447,38 +2598,37 @@
           <a:p>
             <a:pPr lvl="0"/>
             <a:r>
-              <a:rPr lang="en-US" smtClean="0"/>
+              <a:rPr lang="en-US"/>
               <a:t>Click to edit Master text styles</a:t>
             </a:r>
           </a:p>
           <a:p>
             <a:pPr lvl="1"/>
             <a:r>
-              <a:rPr lang="en-US" smtClean="0"/>
+              <a:rPr lang="en-US"/>
               <a:t>Second level</a:t>
             </a:r>
           </a:p>
           <a:p>
             <a:pPr lvl="2"/>
             <a:r>
-              <a:rPr lang="en-US" smtClean="0"/>
+              <a:rPr lang="en-US"/>
               <a:t>Third level</a:t>
             </a:r>
           </a:p>
           <a:p>
             <a:pPr lvl="3"/>
             <a:r>
-              <a:rPr lang="en-US" smtClean="0"/>
+              <a:rPr lang="en-US"/>
               <a:t>Fourth level</a:t>
             </a:r>
           </a:p>
           <a:p>
             <a:pPr lvl="4"/>
             <a:r>
-              <a:rPr lang="en-US" smtClean="0"/>
+              <a:rPr lang="en-US"/>
               <a:t>Fifth level</a:t>
             </a:r>
-            <a:endParaRPr lang="en-US"/>
           </a:p>
         </p:txBody>
       </p:sp>
@@ -2541,7 +2691,7 @@
           <a:p>
             <a:pPr lvl="0"/>
             <a:r>
-              <a:rPr lang="en-US" smtClean="0"/>
+              <a:rPr lang="en-US"/>
               <a:t>Click to edit Master text styles</a:t>
             </a:r>
           </a:p>
@@ -2564,7 +2714,7 @@
           <a:p>
             <a:fld id="{C8261632-79B7-4FFB-9014-EBA4AFC8BBA1}" type="datetime1">
               <a:rPr lang="en-US" smtClean="0"/>
-              <a:t>2023-05-31</a:t>
+              <a:t>6/26/2023</a:t>
             </a:fld>
             <a:endParaRPr lang="en-US"/>
           </a:p>
@@ -2667,10 +2817,9 @@
           </a:lstStyle>
           <a:p>
             <a:r>
-              <a:rPr lang="en-US" smtClean="0"/>
+              <a:rPr lang="en-US"/>
               <a:t>Click to edit Master title style</a:t>
             </a:r>
-            <a:endParaRPr lang="en-US"/>
           </a:p>
         </p:txBody>
       </p:sp>
@@ -2794,7 +2943,7 @@
           <a:p>
             <a:pPr lvl="0"/>
             <a:r>
-              <a:rPr lang="en-US" smtClean="0"/>
+              <a:rPr lang="en-US"/>
               <a:t>Click to edit Master text styles</a:t>
             </a:r>
           </a:p>
@@ -2817,7 +2966,7 @@
           <a:p>
             <a:fld id="{B4BBE29D-F7B6-4174-B822-541289D75FD5}" type="datetime1">
               <a:rPr lang="en-US" smtClean="0"/>
-              <a:t>2023-05-31</a:t>
+              <a:t>6/26/2023</a:t>
             </a:fld>
             <a:endParaRPr lang="en-US"/>
           </a:p>
@@ -2956,10 +3105,9 @@
           <a:lstStyle/>
           <a:p>
             <a:r>
-              <a:rPr lang="en-US" dirty="0" smtClean="0"/>
+              <a:rPr lang="en-US" dirty="0"/>
               <a:t>Click to edit Master title style</a:t>
             </a:r>
-            <a:endParaRPr lang="en-US" dirty="0"/>
           </a:p>
         </p:txBody>
       </p:sp>
@@ -2990,38 +3138,37 @@
           <a:p>
             <a:pPr lvl="0"/>
             <a:r>
-              <a:rPr lang="en-US" dirty="0" smtClean="0"/>
+              <a:rPr lang="en-US" dirty="0"/>
               <a:t>Click to edit Master text styles</a:t>
             </a:r>
           </a:p>
           <a:p>
             <a:pPr lvl="1"/>
             <a:r>
-              <a:rPr lang="en-US" dirty="0" smtClean="0"/>
+              <a:rPr lang="en-US" dirty="0"/>
               <a:t>Second level</a:t>
             </a:r>
           </a:p>
           <a:p>
             <a:pPr lvl="2"/>
             <a:r>
-              <a:rPr lang="en-US" dirty="0" smtClean="0"/>
+              <a:rPr lang="en-US" dirty="0"/>
               <a:t>Third level</a:t>
             </a:r>
           </a:p>
           <a:p>
             <a:pPr lvl="3"/>
             <a:r>
-              <a:rPr lang="en-US" dirty="0" smtClean="0"/>
+              <a:rPr lang="en-US" dirty="0"/>
               <a:t>Fourth level</a:t>
             </a:r>
           </a:p>
           <a:p>
             <a:pPr lvl="4"/>
             <a:r>
-              <a:rPr lang="en-US" dirty="0" smtClean="0"/>
+              <a:rPr lang="en-US" dirty="0"/>
               <a:t>Fifth level</a:t>
             </a:r>
-            <a:endParaRPr lang="en-US" dirty="0"/>
           </a:p>
         </p:txBody>
       </p:sp>
@@ -3060,7 +3207,7 @@
           <a:p>
             <a:fld id="{BB89A798-9C94-422D-B6C9-7619864F2046}" type="datetime1">
               <a:rPr lang="en-US" smtClean="0"/>
-              <a:t>2023-05-31</a:t>
+              <a:t>6/26/2023</a:t>
             </a:fld>
             <a:endParaRPr lang="en-US"/>
           </a:p>
@@ -3483,10 +3630,9 @@
           <a:lstStyle/>
           <a:p>
             <a:r>
-              <a:rPr lang="en-US" dirty="0" smtClean="0"/>
+              <a:rPr lang="en-US" dirty="0"/>
               <a:t>Concurrency: Mutual Exclusion &amp; Synchronization</a:t>
             </a:r>
-            <a:endParaRPr lang="en-US" dirty="0"/>
           </a:p>
         </p:txBody>
       </p:sp>
@@ -3506,10 +3652,9 @@
           <a:lstStyle/>
           <a:p>
             <a:r>
-              <a:rPr lang="en-US" sz="3800" dirty="0" smtClean="0"/>
+              <a:rPr lang="en-US" sz="3800" dirty="0"/>
               <a:t>Covers Chapter#05 from Textbook</a:t>
             </a:r>
-            <a:endParaRPr lang="en-US" sz="3800" dirty="0"/>
           </a:p>
         </p:txBody>
       </p:sp>
@@ -3523,13 +3668,6 @@
   <p:clrMapOvr>
     <a:masterClrMapping/>
   </p:clrMapOvr>
-  <p:timing>
-    <p:tnLst>
-      <p:par>
-        <p:cTn id="1" dur="indefinite" restart="never" nodeType="tmRoot"/>
-      </p:par>
-    </p:tnLst>
-  </p:timing>
 </p:sld>
 </file>
 
@@ -3566,10 +3704,9 @@
           <a:lstStyle/>
           <a:p>
             <a:r>
-              <a:rPr lang="en-US" dirty="0" smtClean="0"/>
-              <a:t>Competition for Resources</a:t>
-            </a:r>
-            <a:endParaRPr lang="en-US" dirty="0"/>
+              <a:rPr lang="en-US" dirty="0"/>
+              <a:t>Process Interaction (Cont.)</a:t>
+            </a:r>
           </a:p>
         </p:txBody>
       </p:sp>
@@ -3585,95 +3722,143 @@
         </p:nvSpPr>
         <p:spPr>
           <a:xfrm>
-            <a:off x="838198" y="1825625"/>
-            <a:ext cx="11270973" cy="4836432"/>
+            <a:off x="838200" y="1825624"/>
+            <a:ext cx="10515600" cy="4792889"/>
           </a:xfrm>
         </p:spPr>
         <p:txBody>
           <a:bodyPr>
-            <a:noAutofit/>
+            <a:normAutofit lnSpcReduction="10000"/>
           </a:bodyPr>
           <a:lstStyle/>
           <a:p>
-            <a:pPr>
+            <a:pPr marL="514350" indent="-514350">
               <a:lnSpc>
                 <a:spcPct val="100000"/>
               </a:lnSpc>
-              <a:spcBef>
-                <a:spcPts val="2000"/>
-              </a:spcBef>
+              <a:buFont typeface="+mj-lt"/>
+              <a:buAutoNum type="arabicPeriod" startAt="2"/>
             </a:pPr>
             <a:r>
-              <a:rPr lang="en-US" dirty="0" smtClean="0"/>
-              <a:t>Concurrent processes come into conflict with each other when they are </a:t>
-            </a:r>
-            <a:r>
-              <a:rPr lang="en-US" b="1" dirty="0" smtClean="0">
+              <a:rPr lang="en-US" b="1" dirty="0">
                 <a:solidFill>
-                  <a:srgbClr val="00B0F0"/>
+                  <a:srgbClr val="0070C0"/>
                 </a:solidFill>
               </a:rPr>
-              <a:t>competing</a:t>
-            </a:r>
-            <a:r>
-              <a:rPr lang="en-US" dirty="0" smtClean="0"/>
-              <a:t> for the use of same resource.</a:t>
-            </a:r>
-          </a:p>
-          <a:p>
-            <a:pPr>
+              <a:t>Processes indirectly aware of each other</a:t>
+            </a:r>
+            <a:endParaRPr lang="en-US" dirty="0"/>
+          </a:p>
+          <a:p>
+            <a:pPr lvl="1">
               <a:lnSpc>
                 <a:spcPct val="100000"/>
               </a:lnSpc>
-              <a:spcBef>
-                <a:spcPts val="2000"/>
-              </a:spcBef>
             </a:pPr>
             <a:r>
-              <a:rPr lang="en-US" dirty="0" smtClean="0"/>
-              <a:t>Processes are sharing resources without being aware of one another.</a:t>
-            </a:r>
-          </a:p>
-          <a:p>
-            <a:pPr>
+              <a:rPr lang="en-US" sz="2600" dirty="0"/>
+              <a:t>Processes that are not necessarily aware of each other by their process IDs.</a:t>
+            </a:r>
+          </a:p>
+          <a:p>
+            <a:pPr lvl="1">
               <a:lnSpc>
                 <a:spcPct val="100000"/>
               </a:lnSpc>
-              <a:spcBef>
-                <a:spcPts val="2000"/>
-              </a:spcBef>
             </a:pPr>
             <a:r>
-              <a:rPr lang="en-US" dirty="0" smtClean="0"/>
-              <a:t>No exchange of information between the competing processes.</a:t>
-            </a:r>
-          </a:p>
-          <a:p>
-            <a:pPr>
+              <a:rPr lang="en-US" sz="2600" dirty="0"/>
+              <a:t>Share access to some object, such as an I/O buffer. </a:t>
+            </a:r>
+          </a:p>
+          <a:p>
+            <a:pPr lvl="1">
               <a:lnSpc>
                 <a:spcPct val="100000"/>
               </a:lnSpc>
-              <a:spcBef>
-                <a:spcPts val="2000"/>
-              </a:spcBef>
             </a:pPr>
             <a:r>
-              <a:rPr lang="en-US" dirty="0" smtClean="0"/>
-              <a:t>The results of each process is not affected by execution of other processes.</a:t>
-            </a:r>
-          </a:p>
-          <a:p>
-            <a:pPr>
+              <a:rPr lang="en-US" sz="2600" dirty="0"/>
+              <a:t>Such processes exhibit </a:t>
+            </a:r>
+            <a:r>
+              <a:rPr lang="en-US" sz="2600" b="1" dirty="0">
+                <a:solidFill>
+                  <a:srgbClr val="0070C0"/>
+                </a:solidFill>
+              </a:rPr>
+              <a:t>cooperation</a:t>
+            </a:r>
+            <a:r>
+              <a:rPr lang="en-US" sz="2600" dirty="0"/>
+              <a:t> in sharing the common object.</a:t>
+            </a:r>
+            <a:endParaRPr lang="en-US" dirty="0"/>
+          </a:p>
+          <a:p>
+            <a:pPr marL="514350" indent="-514350">
               <a:lnSpc>
-                <a:spcPct val="100000"/>
+                <a:spcPct val="110000"/>
               </a:lnSpc>
-              <a:spcBef>
-                <a:spcPts val="2000"/>
-              </a:spcBef>
+              <a:buFont typeface="+mj-lt"/>
+              <a:buAutoNum type="arabicPeriod" startAt="2"/>
             </a:pPr>
             <a:r>
-              <a:rPr lang="en-US" dirty="0" smtClean="0"/>
-              <a:t>Execution of one process may affect the behavior of competing processes, such as affecting the waiting time.</a:t>
+              <a:rPr lang="en-US" b="1" dirty="0">
+                <a:solidFill>
+                  <a:srgbClr val="0070C0"/>
+                </a:solidFill>
+              </a:rPr>
+              <a:t>Processes directly aware of each other</a:t>
+            </a:r>
+            <a:r>
+              <a:rPr lang="en-US" dirty="0"/>
+              <a:t> </a:t>
+            </a:r>
+          </a:p>
+          <a:p>
+            <a:pPr lvl="1">
+              <a:lnSpc>
+                <a:spcPct val="110000"/>
+              </a:lnSpc>
+            </a:pPr>
+            <a:r>
+              <a:rPr lang="en-US" sz="2600" dirty="0"/>
+              <a:t>Processes that are able to communicate with each other by process ID.</a:t>
+            </a:r>
+          </a:p>
+          <a:p>
+            <a:pPr lvl="1">
+              <a:lnSpc>
+                <a:spcPct val="110000"/>
+              </a:lnSpc>
+            </a:pPr>
+            <a:r>
+              <a:rPr lang="en-US" sz="2600" dirty="0"/>
+              <a:t>Designed to work jointly on some activity.</a:t>
+            </a:r>
+          </a:p>
+          <a:p>
+            <a:pPr lvl="1">
+              <a:lnSpc>
+                <a:spcPct val="110000"/>
+              </a:lnSpc>
+            </a:pPr>
+            <a:r>
+              <a:rPr lang="en-US" sz="2600" dirty="0"/>
+              <a:t>Such processes exhibit </a:t>
+            </a:r>
+            <a:r>
+              <a:rPr lang="en-US" sz="2600" b="1" dirty="0">
+                <a:solidFill>
+                  <a:srgbClr val="0070C0"/>
+                </a:solidFill>
+              </a:rPr>
+              <a:t>cooperation</a:t>
+            </a:r>
+            <a:r>
+              <a:rPr lang="en-US" sz="2600" dirty="0"/>
+              <a:t>.</a:t>
             </a:r>
           </a:p>
         </p:txBody>
@@ -3704,20 +3889,13 @@
     </p:spTree>
     <p:extLst>
       <p:ext uri="{BB962C8B-B14F-4D97-AF65-F5344CB8AC3E}">
-        <p14:creationId xmlns:p14="http://schemas.microsoft.com/office/powerpoint/2010/main" val="1086247353"/>
+        <p14:creationId xmlns:p14="http://schemas.microsoft.com/office/powerpoint/2010/main" val="3845189588"/>
       </p:ext>
     </p:extLst>
   </p:cSld>
   <p:clrMapOvr>
     <a:masterClrMapping/>
   </p:clrMapOvr>
-  <p:timing>
-    <p:tnLst>
-      <p:par>
-        <p:cTn id="1" dur="indefinite" restart="never" nodeType="tmRoot"/>
-      </p:par>
-    </p:tnLst>
-  </p:timing>
 </p:sld>
 </file>
 
@@ -3755,17 +3933,8 @@
           <a:p>
             <a:r>
               <a:rPr lang="en-US" dirty="0"/>
-              <a:t>Competition for </a:t>
-            </a:r>
-            <a:r>
-              <a:rPr lang="en-US" dirty="0" smtClean="0"/>
-              <a:t>Resources </a:t>
-            </a:r>
-            <a:r>
-              <a:rPr lang="en-US" i="1" dirty="0" smtClean="0"/>
-              <a:t>(Cont.)</a:t>
-            </a:r>
-            <a:endParaRPr lang="en-US" i="1" dirty="0"/>
+              <a:t>Competition for Resources</a:t>
+            </a:r>
           </a:p>
         </p:txBody>
       </p:sp>
@@ -3781,133 +3950,39 @@
         </p:nvSpPr>
         <p:spPr>
           <a:xfrm>
-            <a:off x="838200" y="1690688"/>
-            <a:ext cx="10831286" cy="4942341"/>
+            <a:off x="838198" y="1825625"/>
+            <a:ext cx="11270973" cy="4836432"/>
           </a:xfrm>
         </p:spPr>
         <p:txBody>
           <a:bodyPr>
-            <a:normAutofit fontScale="92500"/>
+            <a:noAutofit/>
           </a:bodyPr>
           <a:lstStyle/>
-          <a:p>
-            <a:pPr marL="0" indent="0">
-              <a:buNone/>
-            </a:pPr>
-            <a:r>
-              <a:rPr lang="en-US" b="1" dirty="0" smtClean="0">
-                <a:solidFill>
-                  <a:srgbClr val="C00000"/>
-                </a:solidFill>
-              </a:rPr>
-              <a:t>The control </a:t>
-            </a:r>
-            <a:r>
-              <a:rPr lang="en-US" b="1" dirty="0">
-                <a:solidFill>
-                  <a:srgbClr val="C00000"/>
-                </a:solidFill>
-              </a:rPr>
-              <a:t>problems </a:t>
-            </a:r>
-            <a:r>
-              <a:rPr lang="en-US" b="1" dirty="0" smtClean="0">
-                <a:solidFill>
-                  <a:srgbClr val="C00000"/>
-                </a:solidFill>
-              </a:rPr>
-              <a:t>in </a:t>
-            </a:r>
-            <a:r>
-              <a:rPr lang="en-US" b="1" dirty="0">
-                <a:solidFill>
-                  <a:srgbClr val="C00000"/>
-                </a:solidFill>
-              </a:rPr>
-              <a:t>competing </a:t>
-            </a:r>
-            <a:r>
-              <a:rPr lang="en-US" b="1" dirty="0" smtClean="0">
-                <a:solidFill>
-                  <a:srgbClr val="C00000"/>
-                </a:solidFill>
-              </a:rPr>
-              <a:t>processes:</a:t>
-            </a:r>
-          </a:p>
-          <a:p>
-            <a:pPr marL="514350" indent="-514350">
-              <a:lnSpc>
-                <a:spcPct val="100000"/>
-              </a:lnSpc>
-              <a:buFont typeface="+mj-lt"/>
-              <a:buAutoNum type="arabicPeriod"/>
-            </a:pPr>
-            <a:r>
-              <a:rPr lang="en-US" dirty="0" smtClean="0"/>
-              <a:t>Need </a:t>
-            </a:r>
-            <a:r>
-              <a:rPr lang="en-US" dirty="0"/>
-              <a:t>for mutual </a:t>
-            </a:r>
-            <a:r>
-              <a:rPr lang="en-US" dirty="0" smtClean="0"/>
-              <a:t>exclusion</a:t>
-            </a:r>
-            <a:endParaRPr lang="en-US" sz="2600" i="1" dirty="0" smtClean="0"/>
-          </a:p>
-          <a:p>
-            <a:pPr marL="514350" indent="-514350">
-              <a:lnSpc>
-                <a:spcPct val="100000"/>
-              </a:lnSpc>
-              <a:buFont typeface="+mj-lt"/>
-              <a:buAutoNum type="arabicPeriod"/>
-            </a:pPr>
-            <a:r>
-              <a:rPr lang="en-US" dirty="0" smtClean="0"/>
-              <a:t>Deadlock</a:t>
-            </a:r>
-          </a:p>
-          <a:p>
-            <a:pPr marL="514350" indent="-514350">
-              <a:lnSpc>
-                <a:spcPct val="100000"/>
-              </a:lnSpc>
-              <a:buFont typeface="+mj-lt"/>
-              <a:buAutoNum type="arabicPeriod"/>
-            </a:pPr>
-            <a:r>
-              <a:rPr lang="en-US" dirty="0" smtClean="0"/>
-              <a:t>Starvation</a:t>
-            </a:r>
-          </a:p>
           <a:p>
             <a:pPr>
               <a:lnSpc>
                 <a:spcPct val="100000"/>
               </a:lnSpc>
+              <a:spcBef>
+                <a:spcPts val="2000"/>
+              </a:spcBef>
             </a:pPr>
             <a:r>
               <a:rPr lang="en-US" dirty="0"/>
-              <a:t>Control of </a:t>
+              <a:t>Concurrent processes come into conflict with each other when they are </a:t>
             </a:r>
             <a:r>
               <a:rPr lang="en-US" b="1" dirty="0">
                 <a:solidFill>
-                  <a:srgbClr val="0070C0"/>
+                  <a:srgbClr val="00B0F0"/>
                 </a:solidFill>
               </a:rPr>
-              <a:t>competition</a:t>
-            </a:r>
-            <a:r>
-              <a:rPr lang="en-US" dirty="0"/>
-              <a:t> inevitably involves the OS because it is the OS that allocates resources</a:t>
-            </a:r>
-            <a:r>
-              <a:rPr lang="en-US" dirty="0" smtClean="0"/>
-              <a:t>.</a:t>
+              <a:t>competing</a:t>
+            </a:r>
+            <a:r>
+              <a:rPr lang="en-US" dirty="0"/>
+              <a:t> for the use of same resource.</a:t>
             </a:r>
           </a:p>
           <a:p>
@@ -3915,86 +3990,55 @@
               <a:lnSpc>
                 <a:spcPct val="100000"/>
               </a:lnSpc>
+              <a:spcBef>
+                <a:spcPts val="2000"/>
+              </a:spcBef>
             </a:pPr>
             <a:r>
-              <a:rPr lang="en-US" dirty="0" smtClean="0"/>
-              <a:t>Processes will be required to </a:t>
-            </a:r>
-            <a:r>
-              <a:rPr lang="en-US" dirty="0"/>
-              <a:t>express the </a:t>
-            </a:r>
-            <a:r>
-              <a:rPr lang="en-US" dirty="0" smtClean="0"/>
-              <a:t>mutual exclusion requirement in </a:t>
-            </a:r>
-            <a:r>
-              <a:rPr lang="en-US" dirty="0"/>
-              <a:t>some </a:t>
-            </a:r>
-            <a:r>
-              <a:rPr lang="en-US" dirty="0" smtClean="0"/>
-              <a:t>way, </a:t>
-            </a:r>
-            <a:r>
-              <a:rPr lang="en-US" dirty="0"/>
-              <a:t>such as </a:t>
-            </a:r>
-            <a:r>
-              <a:rPr lang="en-US" dirty="0" smtClean="0"/>
-              <a:t>“locking </a:t>
-            </a:r>
-            <a:r>
-              <a:rPr lang="en-US" dirty="0"/>
-              <a:t>a </a:t>
-            </a:r>
-            <a:r>
-              <a:rPr lang="en-US" dirty="0" smtClean="0"/>
-              <a:t>resource” </a:t>
-            </a:r>
-            <a:r>
-              <a:rPr lang="en-US" dirty="0"/>
-              <a:t>prior to its use. </a:t>
-            </a:r>
-            <a:endParaRPr lang="en-US" dirty="0" smtClean="0"/>
+              <a:rPr lang="en-US" dirty="0"/>
+              <a:t>Processes are sharing resources without being aware of one another.</a:t>
+            </a:r>
           </a:p>
           <a:p>
             <a:pPr>
               <a:lnSpc>
                 <a:spcPct val="100000"/>
               </a:lnSpc>
+              <a:spcBef>
+                <a:spcPts val="2000"/>
+              </a:spcBef>
             </a:pPr>
             <a:r>
-              <a:rPr lang="en-US" dirty="0" smtClean="0"/>
-              <a:t>Any </a:t>
-            </a:r>
-            <a:r>
-              <a:rPr lang="en-US" dirty="0"/>
-              <a:t>solution will involve some support from </a:t>
-            </a:r>
-            <a:r>
-              <a:rPr lang="en-US" dirty="0" smtClean="0"/>
-              <a:t>OS</a:t>
-            </a:r>
-            <a:r>
-              <a:rPr lang="en-US" dirty="0"/>
-              <a:t>, such as </a:t>
-            </a:r>
-            <a:r>
-              <a:rPr lang="en-US" dirty="0" smtClean="0"/>
-              <a:t>the provision </a:t>
-            </a:r>
-            <a:r>
-              <a:rPr lang="en-US" dirty="0"/>
-              <a:t>of </a:t>
-            </a:r>
-            <a:r>
-              <a:rPr lang="en-US" dirty="0" smtClean="0"/>
-              <a:t>locking </a:t>
-            </a:r>
-            <a:r>
-              <a:rPr lang="en-US" dirty="0"/>
-              <a:t>facility.</a:t>
+              <a:rPr lang="en-US" dirty="0"/>
+              <a:t>No exchange of information between the competing processes.</a:t>
+            </a:r>
+          </a:p>
+          <a:p>
+            <a:pPr>
+              <a:lnSpc>
+                <a:spcPct val="100000"/>
+              </a:lnSpc>
+              <a:spcBef>
+                <a:spcPts val="2000"/>
+              </a:spcBef>
+            </a:pPr>
+            <a:r>
+              <a:rPr lang="en-US" dirty="0"/>
+              <a:t>The results of each process is not affected by execution of other processes.</a:t>
+            </a:r>
+          </a:p>
+          <a:p>
+            <a:pPr>
+              <a:lnSpc>
+                <a:spcPct val="100000"/>
+              </a:lnSpc>
+              <a:spcBef>
+                <a:spcPts val="2000"/>
+              </a:spcBef>
+            </a:pPr>
+            <a:r>
+              <a:rPr lang="en-US" dirty="0"/>
+              <a:t>Execution of one process may affect the behavior of competing processes, such as affecting the waiting time.</a:t>
             </a:r>
           </a:p>
         </p:txBody>
@@ -4025,20 +4069,13 @@
     </p:spTree>
     <p:extLst>
       <p:ext uri="{BB962C8B-B14F-4D97-AF65-F5344CB8AC3E}">
-        <p14:creationId xmlns:p14="http://schemas.microsoft.com/office/powerpoint/2010/main" val="1708164231"/>
+        <p14:creationId xmlns:p14="http://schemas.microsoft.com/office/powerpoint/2010/main" val="1086247353"/>
       </p:ext>
     </p:extLst>
   </p:cSld>
   <p:clrMapOvr>
     <a:masterClrMapping/>
   </p:clrMapOvr>
-  <p:timing>
-    <p:tnLst>
-      <p:par>
-        <p:cTn id="1" dur="indefinite" restart="never" nodeType="tmRoot"/>
-      </p:par>
-    </p:tnLst>
-  </p:timing>
 </p:sld>
 </file>
 
@@ -4075,10 +4112,13 @@
           <a:lstStyle/>
           <a:p>
             <a:r>
-              <a:rPr lang="en-US" dirty="0" smtClean="0"/>
-              <a:t>Cooperation by Sharing</a:t>
-            </a:r>
-            <a:endParaRPr lang="en-US" dirty="0"/>
+              <a:rPr lang="en-US" dirty="0"/>
+              <a:t>Competition for Resources </a:t>
+            </a:r>
+            <a:r>
+              <a:rPr lang="en-US" i="1" dirty="0"/>
+              <a:t>(Cont.)</a:t>
+            </a:r>
           </a:p>
         </p:txBody>
       </p:sp>
@@ -4094,15 +4134,68 @@
         </p:nvSpPr>
         <p:spPr>
           <a:xfrm>
-            <a:off x="838200" y="1825624"/>
-            <a:ext cx="10515600" cy="4965975"/>
+            <a:off x="838200" y="1690688"/>
+            <a:ext cx="10831286" cy="4942341"/>
           </a:xfrm>
         </p:spPr>
         <p:txBody>
           <a:bodyPr>
-            <a:normAutofit/>
+            <a:normAutofit fontScale="92500"/>
           </a:bodyPr>
           <a:lstStyle/>
+          <a:p>
+            <a:pPr marL="0" indent="0">
+              <a:buNone/>
+            </a:pPr>
+            <a:r>
+              <a:rPr lang="en-US" b="1" dirty="0">
+                <a:solidFill>
+                  <a:srgbClr val="C00000"/>
+                </a:solidFill>
+              </a:rPr>
+              <a:t>The control problems in competing processes:</a:t>
+            </a:r>
+          </a:p>
+          <a:p>
+            <a:pPr marL="514350" indent="-514350">
+              <a:lnSpc>
+                <a:spcPct val="100000"/>
+              </a:lnSpc>
+              <a:buFont typeface="+mj-lt"/>
+              <a:buAutoNum type="arabicPeriod"/>
+            </a:pPr>
+            <a:r>
+              <a:rPr lang="en-US" dirty="0"/>
+              <a:t>Need for mutual exclusion</a:t>
+            </a:r>
+            <a:endParaRPr lang="en-US" sz="2600" i="1" dirty="0"/>
+          </a:p>
+          <a:p>
+            <a:pPr marL="514350" indent="-514350">
+              <a:lnSpc>
+                <a:spcPct val="100000"/>
+              </a:lnSpc>
+              <a:buFont typeface="+mj-lt"/>
+              <a:buAutoNum type="arabicPeriod"/>
+            </a:pPr>
+            <a:r>
+              <a:rPr lang="en-US" dirty="0"/>
+              <a:t>Deadlock</a:t>
+            </a:r>
+          </a:p>
+          <a:p>
+            <a:pPr marL="514350" indent="-514350">
+              <a:lnSpc>
+                <a:spcPct val="100000"/>
+              </a:lnSpc>
+              <a:buFont typeface="+mj-lt"/>
+              <a:buAutoNum type="arabicPeriod"/>
+            </a:pPr>
+            <a:r>
+              <a:rPr lang="en-US" dirty="0"/>
+              <a:t>Starvation</a:t>
+            </a:r>
+          </a:p>
           <a:p>
             <a:pPr>
               <a:lnSpc>
@@ -4110,24 +4203,20 @@
               </a:lnSpc>
             </a:pPr>
             <a:r>
-              <a:rPr lang="en-US" dirty="0" smtClean="0"/>
-              <a:t>These are </a:t>
-            </a:r>
-            <a:r>
-              <a:rPr lang="en-US" dirty="0"/>
-              <a:t>processes that interact with other processes without being explicitly </a:t>
-            </a:r>
-            <a:r>
-              <a:rPr lang="en-US" dirty="0" smtClean="0"/>
-              <a:t>aware of </a:t>
-            </a:r>
-            <a:r>
-              <a:rPr lang="en-US" dirty="0"/>
-              <a:t>them</a:t>
-            </a:r>
-            <a:r>
-              <a:rPr lang="en-US" dirty="0" smtClean="0"/>
-              <a:t>.</a:t>
+              <a:rPr lang="en-US" dirty="0"/>
+              <a:t>Control of </a:t>
+            </a:r>
+            <a:r>
+              <a:rPr lang="en-US" b="1" dirty="0">
+                <a:solidFill>
+                  <a:srgbClr val="0070C0"/>
+                </a:solidFill>
+              </a:rPr>
+              <a:t>competition</a:t>
+            </a:r>
+            <a:r>
+              <a:rPr lang="en-US" dirty="0"/>
+              <a:t> inevitably involves the OS because it is the OS that allocates resources.</a:t>
             </a:r>
           </a:p>
           <a:p>
@@ -4138,7 +4227,7 @@
             </a:pPr>
             <a:r>
               <a:rPr lang="en-US" dirty="0"/>
-              <a:t>The processes must cooperate to ensure that the data they share are properly managed.</a:t>
+              <a:t>Processes will be required to express the mutual exclusion requirement in some way, such as “locking a resource” prior to its use. </a:t>
             </a:r>
           </a:p>
           <a:p>
@@ -4149,71 +4238,7 @@
             </a:pPr>
             <a:r>
               <a:rPr lang="en-US" dirty="0"/>
-              <a:t>Processes are sharing values and the control mechanisms must ensure integrity of shared data.</a:t>
-            </a:r>
-            <a:endParaRPr lang="en-US" dirty="0" smtClean="0"/>
-          </a:p>
-          <a:p>
-            <a:pPr>
-              <a:lnSpc>
-                <a:spcPct val="100000"/>
-              </a:lnSpc>
-            </a:pPr>
-            <a:r>
-              <a:rPr lang="en-US" dirty="0" smtClean="0">
-                <a:solidFill>
-                  <a:srgbClr val="C00000"/>
-                </a:solidFill>
-              </a:rPr>
-              <a:t>E.g. multiple </a:t>
-            </a:r>
-            <a:r>
-              <a:rPr lang="en-US" dirty="0">
-                <a:solidFill>
-                  <a:srgbClr val="C00000"/>
-                </a:solidFill>
-              </a:rPr>
-              <a:t>processes may have access to shared </a:t>
-            </a:r>
-            <a:r>
-              <a:rPr lang="en-US" dirty="0" smtClean="0">
-                <a:solidFill>
-                  <a:srgbClr val="C00000"/>
-                </a:solidFill>
-              </a:rPr>
-              <a:t>variables. Processes </a:t>
-            </a:r>
-            <a:r>
-              <a:rPr lang="en-US" dirty="0">
-                <a:solidFill>
-                  <a:srgbClr val="C00000"/>
-                </a:solidFill>
-              </a:rPr>
-              <a:t>may use and update the shared data </a:t>
-            </a:r>
-            <a:r>
-              <a:rPr lang="en-US" dirty="0" smtClean="0">
-                <a:solidFill>
-                  <a:srgbClr val="C00000"/>
-                </a:solidFill>
-              </a:rPr>
-              <a:t>without reference </a:t>
-            </a:r>
-            <a:r>
-              <a:rPr lang="en-US" dirty="0">
-                <a:solidFill>
-                  <a:srgbClr val="C00000"/>
-                </a:solidFill>
-              </a:rPr>
-              <a:t>to other processes but know that other processes may have access to the same data</a:t>
-            </a:r>
-            <a:r>
-              <a:rPr lang="en-US" dirty="0" smtClean="0">
-                <a:solidFill>
-                  <a:srgbClr val="C00000"/>
-                </a:solidFill>
-              </a:rPr>
-              <a:t>.</a:t>
+              <a:t>Any solution will involve some support from OS, such as the provision of locking facility.</a:t>
             </a:r>
           </a:p>
         </p:txBody>
@@ -4244,20 +4269,13 @@
     </p:spTree>
     <p:extLst>
       <p:ext uri="{BB962C8B-B14F-4D97-AF65-F5344CB8AC3E}">
-        <p14:creationId xmlns:p14="http://schemas.microsoft.com/office/powerpoint/2010/main" val="2532993494"/>
+        <p14:creationId xmlns:p14="http://schemas.microsoft.com/office/powerpoint/2010/main" val="1708164231"/>
       </p:ext>
     </p:extLst>
   </p:cSld>
   <p:clrMapOvr>
     <a:masterClrMapping/>
   </p:clrMapOvr>
-  <p:timing>
-    <p:tnLst>
-      <p:par>
-        <p:cTn id="1" dur="indefinite" restart="never" nodeType="tmRoot"/>
-      </p:par>
-    </p:tnLst>
-  </p:timing>
 </p:sld>
 </file>
 
@@ -4295,13 +4313,8 @@
           <a:p>
             <a:r>
               <a:rPr lang="en-US" dirty="0"/>
-              <a:t>Cooperation by </a:t>
-            </a:r>
-            <a:r>
-              <a:rPr lang="en-US" dirty="0" smtClean="0"/>
-              <a:t>Sharing (Cont.)</a:t>
-            </a:r>
-            <a:endParaRPr lang="en-US" dirty="0"/>
+              <a:t>Cooperation by Sharing</a:t>
+            </a:r>
           </a:p>
         </p:txBody>
       </p:sp>
@@ -4317,119 +4330,61 @@
         </p:nvSpPr>
         <p:spPr>
           <a:xfrm>
-            <a:off x="838200" y="1825625"/>
-            <a:ext cx="10628086" cy="4351338"/>
+            <a:off x="838200" y="1825624"/>
+            <a:ext cx="10515600" cy="4965975"/>
           </a:xfrm>
         </p:spPr>
         <p:txBody>
-          <a:bodyPr/>
-          <a:lstStyle/>
-          <a:p>
-            <a:pPr marL="0" indent="0">
-              <a:buNone/>
+          <a:bodyPr>
+            <a:normAutofit/>
+          </a:bodyPr>
+          <a:lstStyle/>
+          <a:p>
+            <a:pPr>
+              <a:lnSpc>
+                <a:spcPct val="100000"/>
+              </a:lnSpc>
             </a:pPr>
             <a:r>
-              <a:rPr lang="en-US" b="1" dirty="0">
+              <a:rPr lang="en-US" dirty="0"/>
+              <a:t>These are processes that interact with other processes without being explicitly aware of them.</a:t>
+            </a:r>
+          </a:p>
+          <a:p>
+            <a:pPr>
+              <a:lnSpc>
+                <a:spcPct val="100000"/>
+              </a:lnSpc>
+            </a:pPr>
+            <a:r>
+              <a:rPr lang="en-US" dirty="0"/>
+              <a:t>The processes must cooperate to ensure that the data they share are properly managed.</a:t>
+            </a:r>
+          </a:p>
+          <a:p>
+            <a:pPr>
+              <a:lnSpc>
+                <a:spcPct val="100000"/>
+              </a:lnSpc>
+            </a:pPr>
+            <a:r>
+              <a:rPr lang="en-US" dirty="0"/>
+              <a:t>Processes are sharing values and the control mechanisms must ensure integrity of shared data.</a:t>
+            </a:r>
+          </a:p>
+          <a:p>
+            <a:pPr>
+              <a:lnSpc>
+                <a:spcPct val="100000"/>
+              </a:lnSpc>
+            </a:pPr>
+            <a:r>
+              <a:rPr lang="en-US" dirty="0">
                 <a:solidFill>
                   <a:srgbClr val="C00000"/>
                 </a:solidFill>
               </a:rPr>
-              <a:t>The control problems in </a:t>
-            </a:r>
-            <a:r>
-              <a:rPr lang="en-US" b="1" dirty="0" smtClean="0">
-                <a:solidFill>
-                  <a:srgbClr val="C00000"/>
-                </a:solidFill>
-              </a:rPr>
-              <a:t>cooperation by sharing:</a:t>
-            </a:r>
-            <a:endParaRPr lang="en-US" dirty="0" smtClean="0"/>
-          </a:p>
-          <a:p>
-            <a:pPr>
-              <a:lnSpc>
-                <a:spcPct val="100000"/>
-              </a:lnSpc>
-              <a:spcBef>
-                <a:spcPts val="2000"/>
-              </a:spcBef>
-            </a:pPr>
-            <a:r>
-              <a:rPr lang="en-US" dirty="0" smtClean="0"/>
-              <a:t>The </a:t>
-            </a:r>
-            <a:r>
-              <a:rPr lang="en-US" dirty="0"/>
-              <a:t>control </a:t>
-            </a:r>
-            <a:r>
-              <a:rPr lang="en-US" dirty="0" smtClean="0"/>
-              <a:t>problems of </a:t>
-            </a:r>
-            <a:r>
-              <a:rPr lang="en-US" dirty="0"/>
-              <a:t>mutual exclusion, deadlock, and starvation are again present</a:t>
-            </a:r>
-            <a:r>
-              <a:rPr lang="en-US" dirty="0" smtClean="0"/>
-              <a:t>.</a:t>
-            </a:r>
-          </a:p>
-          <a:p>
-            <a:pPr>
-              <a:lnSpc>
-                <a:spcPct val="100000"/>
-              </a:lnSpc>
-              <a:spcBef>
-                <a:spcPts val="2000"/>
-              </a:spcBef>
-            </a:pPr>
-            <a:r>
-              <a:rPr lang="en-US" dirty="0" smtClean="0"/>
-              <a:t>Data </a:t>
-            </a:r>
-            <a:r>
-              <a:rPr lang="en-US" dirty="0"/>
-              <a:t>items may be accessed in two different modes, reading and </a:t>
-            </a:r>
-            <a:r>
-              <a:rPr lang="en-US" dirty="0" smtClean="0"/>
-              <a:t>writing. Only </a:t>
-            </a:r>
-            <a:r>
-              <a:rPr lang="en-US" dirty="0"/>
-              <a:t>writing operations must be mutually exclusive</a:t>
-            </a:r>
-            <a:r>
-              <a:rPr lang="en-US" dirty="0" smtClean="0"/>
-              <a:t>.</a:t>
-            </a:r>
-          </a:p>
-          <a:p>
-            <a:pPr>
-              <a:lnSpc>
-                <a:spcPct val="100000"/>
-              </a:lnSpc>
-              <a:spcBef>
-                <a:spcPts val="2000"/>
-              </a:spcBef>
-            </a:pPr>
-            <a:r>
-              <a:rPr lang="en-US" dirty="0" smtClean="0"/>
-              <a:t>A </a:t>
-            </a:r>
-            <a:r>
-              <a:rPr lang="en-US" dirty="0"/>
-              <a:t>new requirement </a:t>
-            </a:r>
-            <a:r>
-              <a:rPr lang="en-US" dirty="0" smtClean="0"/>
-              <a:t>is that </a:t>
-            </a:r>
-            <a:r>
-              <a:rPr lang="en-US" dirty="0"/>
-              <a:t>of data coherence.</a:t>
+              <a:t>E.g. multiple processes may have access to shared variables. Processes may use and update the shared data without reference to other processes but know that other processes may have access to the same data.</a:t>
             </a:r>
           </a:p>
         </p:txBody>
@@ -4460,20 +4415,13 @@
     </p:spTree>
     <p:extLst>
       <p:ext uri="{BB962C8B-B14F-4D97-AF65-F5344CB8AC3E}">
-        <p14:creationId xmlns:p14="http://schemas.microsoft.com/office/powerpoint/2010/main" val="2265854727"/>
+        <p14:creationId xmlns:p14="http://schemas.microsoft.com/office/powerpoint/2010/main" val="2532993494"/>
       </p:ext>
     </p:extLst>
   </p:cSld>
   <p:clrMapOvr>
     <a:masterClrMapping/>
   </p:clrMapOvr>
-  <p:timing>
-    <p:tnLst>
-      <p:par>
-        <p:cTn id="1" dur="indefinite" restart="never" nodeType="tmRoot"/>
-      </p:par>
-    </p:tnLst>
-  </p:timing>
 </p:sld>
 </file>
 
@@ -4529,180 +4477,12 @@
         <p:spPr>
           <a:xfrm>
             <a:off x="838200" y="1825625"/>
-            <a:ext cx="10515600" cy="4821918"/>
+            <a:ext cx="10628086" cy="4351338"/>
           </a:xfrm>
         </p:spPr>
         <p:txBody>
-          <a:bodyPr>
-            <a:normAutofit lnSpcReduction="10000"/>
-          </a:bodyPr>
-          <a:lstStyle/>
-          <a:p>
-            <a:pPr marL="0" indent="0">
-              <a:buNone/>
-            </a:pPr>
-            <a:r>
-              <a:rPr lang="en-US" b="1" dirty="0" smtClean="0">
-                <a:solidFill>
-                  <a:srgbClr val="C00000"/>
-                </a:solidFill>
-              </a:rPr>
-              <a:t>Example:</a:t>
-            </a:r>
-          </a:p>
-          <a:p>
-            <a:pPr>
-              <a:lnSpc>
-                <a:spcPct val="100000"/>
-              </a:lnSpc>
-            </a:pPr>
-            <a:r>
-              <a:rPr lang="en-US" dirty="0" smtClean="0"/>
-              <a:t>In an </a:t>
-            </a:r>
-            <a:r>
-              <a:rPr lang="en-US" dirty="0"/>
-              <a:t>application in which various data items may be </a:t>
-            </a:r>
-            <a:r>
-              <a:rPr lang="en-US" dirty="0" smtClean="0"/>
-              <a:t>updated, suppose </a:t>
-            </a:r>
-            <a:r>
-              <a:rPr lang="en-US" dirty="0"/>
-              <a:t>two items of data </a:t>
-            </a:r>
-            <a:r>
-              <a:rPr lang="en-US" b="1" dirty="0">
-                <a:solidFill>
-                  <a:srgbClr val="0070C0"/>
-                </a:solidFill>
-              </a:rPr>
-              <a:t>a</a:t>
-            </a:r>
-            <a:r>
-              <a:rPr lang="en-US" dirty="0"/>
-              <a:t> and </a:t>
-            </a:r>
-            <a:r>
-              <a:rPr lang="en-US" b="1" dirty="0">
-                <a:solidFill>
-                  <a:srgbClr val="0070C0"/>
-                </a:solidFill>
-              </a:rPr>
-              <a:t>b</a:t>
-            </a:r>
-            <a:r>
-              <a:rPr lang="en-US" dirty="0"/>
-              <a:t> are </a:t>
-            </a:r>
-            <a:r>
-              <a:rPr lang="en-US" dirty="0" smtClean="0"/>
-              <a:t>to be </a:t>
-            </a:r>
-            <a:r>
-              <a:rPr lang="en-US" dirty="0"/>
-              <a:t>maintained in the relationship </a:t>
-            </a:r>
-            <a:r>
-              <a:rPr lang="en-US" b="1" dirty="0">
-                <a:solidFill>
-                  <a:srgbClr val="0070C0"/>
-                </a:solidFill>
-              </a:rPr>
-              <a:t>a = b</a:t>
-            </a:r>
-            <a:r>
-              <a:rPr lang="en-US" dirty="0"/>
-              <a:t>. </a:t>
-            </a:r>
-            <a:r>
-              <a:rPr lang="en-US" dirty="0" smtClean="0"/>
-              <a:t>That is, any </a:t>
-            </a:r>
-            <a:r>
-              <a:rPr lang="en-US" dirty="0"/>
-              <a:t>program that updates one value </a:t>
-            </a:r>
-            <a:r>
-              <a:rPr lang="en-US" dirty="0" smtClean="0"/>
-              <a:t>must </a:t>
-            </a:r>
-            <a:r>
-              <a:rPr lang="en-US" dirty="0"/>
-              <a:t>also update the other to maintain the relationship</a:t>
-            </a:r>
-            <a:r>
-              <a:rPr lang="en-US" dirty="0" smtClean="0"/>
-              <a:t>.</a:t>
-            </a:r>
-          </a:p>
-          <a:p>
-            <a:pPr>
-              <a:lnSpc>
-                <a:spcPct val="100000"/>
-              </a:lnSpc>
-            </a:pPr>
-            <a:r>
-              <a:rPr lang="pt-BR" dirty="0"/>
-              <a:t>P1</a:t>
-            </a:r>
-            <a:r>
-              <a:rPr lang="pt-BR" dirty="0" smtClean="0"/>
-              <a:t>: 	a </a:t>
-            </a:r>
-            <a:r>
-              <a:rPr lang="pt-BR" dirty="0"/>
-              <a:t>= a + 1</a:t>
-            </a:r>
-            <a:r>
-              <a:rPr lang="pt-BR" dirty="0" smtClean="0"/>
-              <a:t>; 	b </a:t>
-            </a:r>
-            <a:r>
-              <a:rPr lang="pt-BR" dirty="0"/>
-              <a:t>= b + 1</a:t>
-            </a:r>
-            <a:r>
-              <a:rPr lang="pt-BR" dirty="0" smtClean="0"/>
-              <a:t>;</a:t>
-            </a:r>
-            <a:endParaRPr lang="pt-BR" dirty="0"/>
-          </a:p>
-          <a:p>
-            <a:pPr>
-              <a:lnSpc>
-                <a:spcPct val="100000"/>
-              </a:lnSpc>
-              <a:spcAft>
-                <a:spcPts val="2000"/>
-              </a:spcAft>
-            </a:pPr>
-            <a:r>
-              <a:rPr lang="pt-BR" dirty="0"/>
-              <a:t>P2</a:t>
-            </a:r>
-            <a:r>
-              <a:rPr lang="pt-BR" dirty="0" smtClean="0"/>
-              <a:t>: 	b </a:t>
-            </a:r>
-            <a:r>
-              <a:rPr lang="pt-BR" dirty="0"/>
-              <a:t>= 2 * b</a:t>
-            </a:r>
-            <a:r>
-              <a:rPr lang="pt-BR" dirty="0" smtClean="0"/>
-              <a:t>; 	a </a:t>
-            </a:r>
-            <a:r>
-              <a:rPr lang="pt-BR" dirty="0"/>
-              <a:t>= 2 * a</a:t>
-            </a:r>
-            <a:r>
-              <a:rPr lang="pt-BR" dirty="0" smtClean="0"/>
-              <a:t>;</a:t>
-            </a:r>
-          </a:p>
+          <a:bodyPr/>
+          <a:lstStyle/>
           <a:p>
             <a:pPr marL="0" indent="0">
               <a:buNone/>
@@ -4713,13 +4493,50 @@
                   <a:srgbClr val="C00000"/>
                 </a:solidFill>
               </a:rPr>
-              <a:t>Scenaior#01</a:t>
-            </a:r>
-          </a:p>
-          <a:p>
-            <a:r>
-              <a:rPr lang="en-US" dirty="0"/>
-              <a:t>Each process executed separately will leave the shared data in a consistent state. Hence, relationship is satisfied.</a:t>
+              <a:t>The control problems in cooperation by sharing:</a:t>
+            </a:r>
+            <a:endParaRPr lang="en-US" dirty="0"/>
+          </a:p>
+          <a:p>
+            <a:pPr>
+              <a:lnSpc>
+                <a:spcPct val="100000"/>
+              </a:lnSpc>
+              <a:spcBef>
+                <a:spcPts val="2000"/>
+              </a:spcBef>
+            </a:pPr>
+            <a:r>
+              <a:rPr lang="en-US" dirty="0"/>
+              <a:t>The control problems of mutual exclusion, deadlock, and starvation are again present.</a:t>
+            </a:r>
+          </a:p>
+          <a:p>
+            <a:pPr>
+              <a:lnSpc>
+                <a:spcPct val="100000"/>
+              </a:lnSpc>
+              <a:spcBef>
+                <a:spcPts val="2000"/>
+              </a:spcBef>
+            </a:pPr>
+            <a:r>
+              <a:rPr lang="en-US" dirty="0"/>
+              <a:t>Data items may be accessed in two different modes, reading and writing. Only writing operations must be mutually exclusive.</a:t>
+            </a:r>
+          </a:p>
+          <a:p>
+            <a:pPr>
+              <a:lnSpc>
+                <a:spcPct val="100000"/>
+              </a:lnSpc>
+              <a:spcBef>
+                <a:spcPts val="2000"/>
+              </a:spcBef>
+            </a:pPr>
+            <a:r>
+              <a:rPr lang="en-US" dirty="0"/>
+              <a:t>A new requirement is that of data coherence.</a:t>
             </a:r>
           </a:p>
         </p:txBody>
@@ -4750,20 +4567,13 @@
     </p:spTree>
     <p:extLst>
       <p:ext uri="{BB962C8B-B14F-4D97-AF65-F5344CB8AC3E}">
-        <p14:creationId xmlns:p14="http://schemas.microsoft.com/office/powerpoint/2010/main" val="4068156805"/>
+        <p14:creationId xmlns:p14="http://schemas.microsoft.com/office/powerpoint/2010/main" val="2265854727"/>
       </p:ext>
     </p:extLst>
   </p:cSld>
   <p:clrMapOvr>
     <a:masterClrMapping/>
   </p:clrMapOvr>
-  <p:timing>
-    <p:tnLst>
-      <p:par>
-        <p:cTn id="1" dur="indefinite" restart="never" nodeType="tmRoot"/>
-      </p:par>
-    </p:tnLst>
-  </p:timing>
 </p:sld>
 </file>
 
@@ -4819,14 +4629,99 @@
         <p:spPr>
           <a:xfrm>
             <a:off x="838200" y="1825625"/>
-            <a:ext cx="10515600" cy="4705804"/>
+            <a:ext cx="10515600" cy="4821918"/>
           </a:xfrm>
         </p:spPr>
         <p:txBody>
           <a:bodyPr>
-            <a:normAutofit/>
+            <a:normAutofit lnSpcReduction="10000"/>
           </a:bodyPr>
           <a:lstStyle/>
+          <a:p>
+            <a:pPr marL="0" indent="0">
+              <a:buNone/>
+            </a:pPr>
+            <a:r>
+              <a:rPr lang="en-US" b="1" dirty="0">
+                <a:solidFill>
+                  <a:srgbClr val="C00000"/>
+                </a:solidFill>
+              </a:rPr>
+              <a:t>Example:</a:t>
+            </a:r>
+          </a:p>
+          <a:p>
+            <a:pPr>
+              <a:lnSpc>
+                <a:spcPct val="100000"/>
+              </a:lnSpc>
+            </a:pPr>
+            <a:r>
+              <a:rPr lang="en-US" dirty="0"/>
+              <a:t>In an application in which various data items may be updated, suppose two items of data </a:t>
+            </a:r>
+            <a:r>
+              <a:rPr lang="en-US" b="1" dirty="0">
+                <a:solidFill>
+                  <a:srgbClr val="0070C0"/>
+                </a:solidFill>
+              </a:rPr>
+              <a:t>a</a:t>
+            </a:r>
+            <a:r>
+              <a:rPr lang="en-US" dirty="0"/>
+              <a:t> and </a:t>
+            </a:r>
+            <a:r>
+              <a:rPr lang="en-US" b="1" dirty="0">
+                <a:solidFill>
+                  <a:srgbClr val="0070C0"/>
+                </a:solidFill>
+              </a:rPr>
+              <a:t>b</a:t>
+            </a:r>
+            <a:r>
+              <a:rPr lang="en-US" dirty="0"/>
+              <a:t> are to be maintained in the relationship </a:t>
+            </a:r>
+            <a:r>
+              <a:rPr lang="en-US" b="1" dirty="0">
+                <a:solidFill>
+                  <a:srgbClr val="0070C0"/>
+                </a:solidFill>
+              </a:rPr>
+              <a:t>a = b</a:t>
+            </a:r>
+            <a:r>
+              <a:rPr lang="en-US" dirty="0"/>
+              <a:t>. That is, any program that updates one value must also update the other to maintain the relationship.</a:t>
+            </a:r>
+          </a:p>
+          <a:p>
+            <a:pPr>
+              <a:lnSpc>
+                <a:spcPct val="100000"/>
+              </a:lnSpc>
+            </a:pPr>
+            <a:r>
+              <a:rPr lang="pt-BR" dirty="0"/>
+              <a:t>P1: 	a = a + 1; 	b = b + 1;</a:t>
+            </a:r>
+          </a:p>
+          <a:p>
+            <a:pPr>
+              <a:lnSpc>
+                <a:spcPct val="100000"/>
+              </a:lnSpc>
+              <a:spcAft>
+                <a:spcPts val="2000"/>
+              </a:spcAft>
+            </a:pPr>
+            <a:r>
+              <a:rPr lang="pt-BR" dirty="0"/>
+              <a:t>P2: 	b = 2 * b; 	a = 2 * a;</a:t>
+            </a:r>
+          </a:p>
           <a:p>
             <a:pPr marL="0" indent="0">
               <a:buNone/>
@@ -4842,72 +4737,9 @@
           </a:p>
           <a:p>
             <a:r>
-              <a:rPr lang="en-US" dirty="0" smtClean="0"/>
-              <a:t>The </a:t>
-            </a:r>
-            <a:r>
-              <a:rPr lang="en-US" dirty="0"/>
-              <a:t>following concurrent execution </a:t>
-            </a:r>
-            <a:r>
-              <a:rPr lang="en-US" dirty="0" smtClean="0"/>
-              <a:t>sequence is adopted, </a:t>
-            </a:r>
-            <a:r>
-              <a:rPr lang="en-US" dirty="0"/>
-              <a:t>in which the two processes respect mutual exclusion on each individual data item (a and b</a:t>
-            </a:r>
-            <a:r>
-              <a:rPr lang="en-US" dirty="0" smtClean="0"/>
-              <a:t>).</a:t>
-            </a:r>
-          </a:p>
-          <a:p>
-            <a:r>
-              <a:rPr lang="pt-BR" dirty="0"/>
-              <a:t>a = a + 1;</a:t>
-            </a:r>
-          </a:p>
-          <a:p>
-            <a:r>
-              <a:rPr lang="pt-BR" dirty="0"/>
-              <a:t>b = 2 * b;</a:t>
-            </a:r>
-          </a:p>
-          <a:p>
-            <a:r>
-              <a:rPr lang="pt-BR" dirty="0"/>
-              <a:t>b = b + 1;</a:t>
-            </a:r>
-          </a:p>
-          <a:p>
-            <a:r>
-              <a:rPr lang="pt-BR" dirty="0"/>
-              <a:t>a = 2 * a</a:t>
-            </a:r>
-            <a:r>
-              <a:rPr lang="pt-BR" dirty="0" smtClean="0"/>
-              <a:t>;</a:t>
-            </a:r>
-          </a:p>
-          <a:p>
-            <a:r>
-              <a:rPr lang="en-US" dirty="0"/>
-              <a:t>At the end of this execution sequence, the condition </a:t>
-            </a:r>
-            <a:r>
-              <a:rPr lang="en-US" b="1" dirty="0">
-                <a:solidFill>
-                  <a:srgbClr val="0070C0"/>
-                </a:solidFill>
-              </a:rPr>
-              <a:t>a = b</a:t>
-            </a:r>
-            <a:r>
-              <a:rPr lang="en-US" dirty="0"/>
-              <a:t> no longer holds.</a:t>
-            </a:r>
-            <a:endParaRPr lang="en-US" dirty="0" smtClean="0"/>
+              <a:rPr lang="en-US" dirty="0"/>
+              <a:t>Each process executed separately will leave the shared data in a consistent state. Hence, relationship is satisfied.</a:t>
+            </a:r>
           </a:p>
         </p:txBody>
       </p:sp>
@@ -4937,20 +4769,13 @@
     </p:spTree>
     <p:extLst>
       <p:ext uri="{BB962C8B-B14F-4D97-AF65-F5344CB8AC3E}">
-        <p14:creationId xmlns:p14="http://schemas.microsoft.com/office/powerpoint/2010/main" val="1891028938"/>
+        <p14:creationId xmlns:p14="http://schemas.microsoft.com/office/powerpoint/2010/main" val="4068156805"/>
       </p:ext>
     </p:extLst>
   </p:cSld>
   <p:clrMapOvr>
     <a:masterClrMapping/>
   </p:clrMapOvr>
-  <p:timing>
-    <p:tnLst>
-      <p:par>
-        <p:cTn id="1" dur="indefinite" restart="never" nodeType="tmRoot"/>
-      </p:par>
-    </p:tnLst>
-  </p:timing>
 </p:sld>
 </file>
 
@@ -4988,13 +4813,8 @@
           <a:p>
             <a:r>
               <a:rPr lang="en-US" dirty="0"/>
-              <a:t>Cooperation by </a:t>
-            </a:r>
-            <a:r>
-              <a:rPr lang="en-US" dirty="0" smtClean="0"/>
-              <a:t>Communication</a:t>
-            </a:r>
-            <a:endParaRPr lang="en-US" dirty="0"/>
+              <a:t>Cooperation by Sharing (Cont.)</a:t>
+            </a:r>
           </a:p>
         </p:txBody>
       </p:sp>
@@ -5010,98 +4830,74 @@
         </p:nvSpPr>
         <p:spPr>
           <a:xfrm>
-            <a:off x="838199" y="1825625"/>
-            <a:ext cx="10918372" cy="4351338"/>
+            <a:off x="838200" y="1825625"/>
+            <a:ext cx="10515600" cy="4705804"/>
           </a:xfrm>
         </p:spPr>
         <p:txBody>
-          <a:bodyPr/>
-          <a:lstStyle/>
-          <a:p>
-            <a:pPr>
-              <a:lnSpc>
-                <a:spcPct val="100000"/>
-              </a:lnSpc>
-              <a:spcBef>
-                <a:spcPts val="2000"/>
-              </a:spcBef>
+          <a:bodyPr>
+            <a:normAutofit/>
+          </a:bodyPr>
+          <a:lstStyle/>
+          <a:p>
+            <a:pPr marL="0" indent="0">
+              <a:buNone/>
             </a:pPr>
             <a:r>
-              <a:rPr lang="en-US" dirty="0"/>
-              <a:t>When processes cooperate by communication</a:t>
-            </a:r>
-            <a:r>
-              <a:rPr lang="en-US" dirty="0" smtClean="0"/>
-              <a:t>, various </a:t>
-            </a:r>
-            <a:r>
-              <a:rPr lang="en-US" dirty="0"/>
-              <a:t>processes participate in a common effort that links all of the processes. </a:t>
-            </a:r>
-            <a:endParaRPr lang="en-US" dirty="0" smtClean="0"/>
-          </a:p>
-          <a:p>
-            <a:pPr>
-              <a:lnSpc>
-                <a:spcPct val="100000"/>
-              </a:lnSpc>
-              <a:spcBef>
-                <a:spcPts val="2000"/>
-              </a:spcBef>
-            </a:pPr>
-            <a:r>
-              <a:rPr lang="en-US" dirty="0" smtClean="0"/>
-              <a:t>The </a:t>
-            </a:r>
-            <a:r>
-              <a:rPr lang="en-US" dirty="0"/>
-              <a:t>communication provides a way to </a:t>
-            </a:r>
-            <a:r>
-              <a:rPr lang="en-US" dirty="0" smtClean="0"/>
-              <a:t>synchronize </a:t>
-            </a:r>
-            <a:r>
-              <a:rPr lang="en-US" dirty="0"/>
-              <a:t>or </a:t>
-            </a:r>
-            <a:r>
-              <a:rPr lang="en-US" dirty="0" smtClean="0"/>
-              <a:t>coordinate </a:t>
-            </a:r>
-            <a:r>
-              <a:rPr lang="en-US" dirty="0"/>
-              <a:t>the various activities</a:t>
-            </a:r>
-            <a:r>
-              <a:rPr lang="en-US" dirty="0" smtClean="0"/>
-              <a:t>.</a:t>
-            </a:r>
-          </a:p>
-          <a:p>
-            <a:pPr>
-              <a:lnSpc>
-                <a:spcPct val="100000"/>
-              </a:lnSpc>
-              <a:spcBef>
-                <a:spcPts val="2000"/>
-              </a:spcBef>
-            </a:pPr>
-            <a:r>
-              <a:rPr lang="en-US" dirty="0"/>
-              <a:t>Typically, communication can be characterized as consisting of messages </a:t>
-            </a:r>
-            <a:r>
-              <a:rPr lang="en-US" dirty="0" smtClean="0"/>
-              <a:t>of some </a:t>
-            </a:r>
-            <a:r>
-              <a:rPr lang="en-US" dirty="0"/>
-              <a:t>sort</a:t>
-            </a:r>
-            <a:r>
-              <a:rPr lang="en-US" dirty="0" smtClean="0"/>
-              <a:t>.</a:t>
+              <a:rPr lang="en-US" b="1" dirty="0">
+                <a:solidFill>
+                  <a:srgbClr val="C00000"/>
+                </a:solidFill>
+              </a:rPr>
+              <a:t>Scenaior#01</a:t>
+            </a:r>
+          </a:p>
+          <a:p>
+            <a:r>
+              <a:rPr lang="en-US" dirty="0"/>
+              <a:t>The following concurrent execution sequence is adopted, in which the two processes respect mutual exclusion on each individual data item (a and b).</a:t>
+            </a:r>
+          </a:p>
+          <a:p>
+            <a:r>
+              <a:rPr lang="pt-BR" dirty="0"/>
+              <a:t>a = a + 1;</a:t>
+            </a:r>
+          </a:p>
+          <a:p>
+            <a:r>
+              <a:rPr lang="pt-BR" dirty="0"/>
+              <a:t>b = 2 * b;</a:t>
+            </a:r>
+          </a:p>
+          <a:p>
+            <a:r>
+              <a:rPr lang="pt-BR" dirty="0"/>
+              <a:t>b = b + 1;</a:t>
+            </a:r>
+          </a:p>
+          <a:p>
+            <a:r>
+              <a:rPr lang="pt-BR" dirty="0"/>
+              <a:t>a = 2 * a;</a:t>
+            </a:r>
+          </a:p>
+          <a:p>
+            <a:r>
+              <a:rPr lang="en-US" dirty="0"/>
+              <a:t>At the end of this execution sequence, the condition </a:t>
+            </a:r>
+            <a:r>
+              <a:rPr lang="en-US" b="1" dirty="0">
+                <a:solidFill>
+                  <a:srgbClr val="0070C0"/>
+                </a:solidFill>
+              </a:rPr>
+              <a:t>a = b</a:t>
+            </a:r>
+            <a:r>
+              <a:rPr lang="en-US" dirty="0"/>
+              <a:t> no longer holds.</a:t>
             </a:r>
           </a:p>
         </p:txBody>
@@ -5132,20 +4928,13 @@
     </p:spTree>
     <p:extLst>
       <p:ext uri="{BB962C8B-B14F-4D97-AF65-F5344CB8AC3E}">
-        <p14:creationId xmlns:p14="http://schemas.microsoft.com/office/powerpoint/2010/main" val="2681598194"/>
+        <p14:creationId xmlns:p14="http://schemas.microsoft.com/office/powerpoint/2010/main" val="1891028938"/>
       </p:ext>
     </p:extLst>
   </p:cSld>
   <p:clrMapOvr>
     <a:masterClrMapping/>
   </p:clrMapOvr>
-  <p:timing>
-    <p:tnLst>
-      <p:par>
-        <p:cTn id="1" dur="indefinite" restart="never" nodeType="tmRoot"/>
-      </p:par>
-    </p:tnLst>
-  </p:timing>
 </p:sld>
 </file>
 
@@ -5183,7 +4972,7 @@
           <a:p>
             <a:r>
               <a:rPr lang="en-US" dirty="0"/>
-              <a:t>Cooperation by Communication (Cont.)</a:t>
+              <a:t>Cooperation by Communication</a:t>
             </a:r>
           </a:p>
         </p:txBody>
@@ -5198,60 +4987,27 @@
             <p:ph idx="1"/>
           </p:nvPr>
         </p:nvSpPr>
-        <p:spPr/>
-        <p:txBody>
-          <a:bodyPr/>
-          <a:lstStyle/>
-          <a:p>
-            <a:pPr marL="0" indent="0">
-              <a:lnSpc>
-                <a:spcPct val="100000"/>
-              </a:lnSpc>
-              <a:buNone/>
-            </a:pPr>
-            <a:r>
-              <a:rPr lang="en-US" b="1" dirty="0">
-                <a:solidFill>
-                  <a:srgbClr val="C00000"/>
-                </a:solidFill>
-              </a:rPr>
-              <a:t>The control problems in cooperation by </a:t>
-            </a:r>
-            <a:r>
-              <a:rPr lang="en-US" b="1" dirty="0" smtClean="0">
-                <a:solidFill>
-                  <a:srgbClr val="C00000"/>
-                </a:solidFill>
-              </a:rPr>
-              <a:t>communication:</a:t>
-            </a:r>
-            <a:endParaRPr lang="en-US" dirty="0" smtClean="0"/>
-          </a:p>
+        <p:spPr>
+          <a:xfrm>
+            <a:off x="838199" y="1825625"/>
+            <a:ext cx="10918372" cy="4351338"/>
+          </a:xfrm>
+        </p:spPr>
+        <p:txBody>
+          <a:bodyPr/>
+          <a:lstStyle/>
           <a:p>
             <a:pPr>
               <a:lnSpc>
                 <a:spcPct val="100000"/>
               </a:lnSpc>
+              <a:spcBef>
+                <a:spcPts val="2000"/>
+              </a:spcBef>
             </a:pPr>
             <a:r>
-              <a:rPr lang="en-US" dirty="0" smtClean="0"/>
-              <a:t>Since no resource is </a:t>
-            </a:r>
-            <a:r>
-              <a:rPr lang="en-US" dirty="0"/>
-              <a:t>shared between processes in </a:t>
-            </a:r>
-            <a:r>
-              <a:rPr lang="en-US" dirty="0" smtClean="0"/>
-              <a:t>passing </a:t>
-            </a:r>
-            <a:r>
-              <a:rPr lang="en-US" dirty="0"/>
-              <a:t>messages, mutual exclusion is not a control </a:t>
-            </a:r>
-            <a:r>
-              <a:rPr lang="en-US" dirty="0" smtClean="0"/>
-              <a:t>requirement.</a:t>
+              <a:rPr lang="en-US" dirty="0"/>
+              <a:t>When processes cooperate by communication, various processes participate in a common effort that links all of the processes. </a:t>
             </a:r>
           </a:p>
           <a:p>
@@ -5259,18 +5015,27 @@
               <a:lnSpc>
                 <a:spcPct val="100000"/>
               </a:lnSpc>
+              <a:spcBef>
+                <a:spcPts val="2000"/>
+              </a:spcBef>
             </a:pPr>
             <a:r>
-              <a:rPr lang="en-US" dirty="0" smtClean="0"/>
-              <a:t>However, </a:t>
-            </a:r>
-            <a:r>
-              <a:rPr lang="en-US" dirty="0"/>
-              <a:t>the problems of deadlock and starvation are still present</a:t>
-            </a:r>
-            <a:r>
-              <a:rPr lang="en-US" dirty="0" smtClean="0"/>
-              <a:t>.</a:t>
+              <a:rPr lang="en-US" dirty="0"/>
+              <a:t>The communication provides a way to synchronize or coordinate the various activities.</a:t>
+            </a:r>
+          </a:p>
+          <a:p>
+            <a:pPr>
+              <a:lnSpc>
+                <a:spcPct val="100000"/>
+              </a:lnSpc>
+              <a:spcBef>
+                <a:spcPts val="2000"/>
+              </a:spcBef>
+            </a:pPr>
+            <a:r>
+              <a:rPr lang="en-US" dirty="0"/>
+              <a:t>Typically, communication can be characterized as consisting of messages of some sort.</a:t>
             </a:r>
           </a:p>
         </p:txBody>
@@ -5301,20 +5066,13 @@
     </p:spTree>
     <p:extLst>
       <p:ext uri="{BB962C8B-B14F-4D97-AF65-F5344CB8AC3E}">
-        <p14:creationId xmlns:p14="http://schemas.microsoft.com/office/powerpoint/2010/main" val="3438129788"/>
+        <p14:creationId xmlns:p14="http://schemas.microsoft.com/office/powerpoint/2010/main" val="2681598194"/>
       </p:ext>
     </p:extLst>
   </p:cSld>
   <p:clrMapOvr>
     <a:masterClrMapping/>
   </p:clrMapOvr>
-  <p:timing>
-    <p:tnLst>
-      <p:par>
-        <p:cTn id="1" dur="indefinite" restart="never" nodeType="tmRoot"/>
-      </p:par>
-    </p:tnLst>
-  </p:timing>
 </p:sld>
 </file>
 
@@ -5350,7 +5108,10 @@
           <a:bodyPr/>
           <a:lstStyle/>
           <a:p>
-            <a:endParaRPr lang="en-US"/>
+            <a:r>
+              <a:rPr lang="en-US" dirty="0"/>
+              <a:t>Cooperation by Communication (Cont.)</a:t>
+            </a:r>
           </a:p>
         </p:txBody>
       </p:sp>
@@ -5369,7 +5130,43 @@
           <a:bodyPr/>
           <a:lstStyle/>
           <a:p>
-            <a:endParaRPr lang="en-US"/>
+            <a:pPr marL="0" indent="0">
+              <a:lnSpc>
+                <a:spcPct val="100000"/>
+              </a:lnSpc>
+              <a:buNone/>
+            </a:pPr>
+            <a:r>
+              <a:rPr lang="en-US" b="1" dirty="0">
+                <a:solidFill>
+                  <a:srgbClr val="C00000"/>
+                </a:solidFill>
+              </a:rPr>
+              <a:t>The control problems in cooperation by communication:</a:t>
+            </a:r>
+            <a:endParaRPr lang="en-US" dirty="0"/>
+          </a:p>
+          <a:p>
+            <a:pPr>
+              <a:lnSpc>
+                <a:spcPct val="100000"/>
+              </a:lnSpc>
+            </a:pPr>
+            <a:r>
+              <a:rPr lang="en-US" dirty="0"/>
+              <a:t>Since no resource is shared between processes in passing messages, mutual exclusion is not a control requirement.</a:t>
+            </a:r>
+          </a:p>
+          <a:p>
+            <a:pPr>
+              <a:lnSpc>
+                <a:spcPct val="100000"/>
+              </a:lnSpc>
+            </a:pPr>
+            <a:r>
+              <a:rPr lang="en-US" dirty="0"/>
+              <a:t>However, the problems of deadlock and starvation are still present.</a:t>
+            </a:r>
           </a:p>
         </p:txBody>
       </p:sp>
@@ -5391,6 +5188,97 @@
             <a:fld id="{01433A5C-A324-44F3-9AD9-9CE9975D1B38}" type="slidenum">
               <a:rPr lang="en-US" smtClean="0"/>
               <a:t>18</a:t>
+            </a:fld>
+            <a:endParaRPr lang="en-US"/>
+          </a:p>
+        </p:txBody>
+      </p:sp>
+    </p:spTree>
+    <p:extLst>
+      <p:ext uri="{BB962C8B-B14F-4D97-AF65-F5344CB8AC3E}">
+        <p14:creationId xmlns:p14="http://schemas.microsoft.com/office/powerpoint/2010/main" val="3438129788"/>
+      </p:ext>
+    </p:extLst>
+  </p:cSld>
+  <p:clrMapOvr>
+    <a:masterClrMapping/>
+  </p:clrMapOvr>
+</p:sld>
+</file>
+
+<file path=ppt/slides/slide19.xml><?xml version="1.0" encoding="utf-8"?>
+<p:sld xmlns:a="http://schemas.openxmlformats.org/drawingml/2006/main" xmlns:r="http://schemas.openxmlformats.org/officeDocument/2006/relationships" xmlns:p="http://schemas.openxmlformats.org/presentationml/2006/main">
+  <p:cSld>
+    <p:spTree>
+      <p:nvGrpSpPr>
+        <p:cNvPr id="1" name=""/>
+        <p:cNvGrpSpPr/>
+        <p:nvPr/>
+      </p:nvGrpSpPr>
+      <p:grpSpPr>
+        <a:xfrm>
+          <a:off x="0" y="0"/>
+          <a:ext cx="0" cy="0"/>
+          <a:chOff x="0" y="0"/>
+          <a:chExt cx="0" cy="0"/>
+        </a:xfrm>
+      </p:grpSpPr>
+      <p:sp>
+        <p:nvSpPr>
+          <p:cNvPr id="2" name="Title 1"/>
+          <p:cNvSpPr>
+            <a:spLocks noGrp="1"/>
+          </p:cNvSpPr>
+          <p:nvPr>
+            <p:ph type="title"/>
+          </p:nvPr>
+        </p:nvSpPr>
+        <p:spPr/>
+        <p:txBody>
+          <a:bodyPr/>
+          <a:lstStyle/>
+          <a:p>
+            <a:endParaRPr lang="en-US"/>
+          </a:p>
+        </p:txBody>
+      </p:sp>
+      <p:sp>
+        <p:nvSpPr>
+          <p:cNvPr id="3" name="Content Placeholder 2"/>
+          <p:cNvSpPr>
+            <a:spLocks noGrp="1"/>
+          </p:cNvSpPr>
+          <p:nvPr>
+            <p:ph idx="1"/>
+          </p:nvPr>
+        </p:nvSpPr>
+        <p:spPr/>
+        <p:txBody>
+          <a:bodyPr/>
+          <a:lstStyle/>
+          <a:p>
+            <a:endParaRPr lang="en-US"/>
+          </a:p>
+        </p:txBody>
+      </p:sp>
+      <p:sp>
+        <p:nvSpPr>
+          <p:cNvPr id="4" name="Slide Number Placeholder 3"/>
+          <p:cNvSpPr>
+            <a:spLocks noGrp="1"/>
+          </p:cNvSpPr>
+          <p:nvPr>
+            <p:ph type="sldNum" sz="quarter" idx="12"/>
+          </p:nvPr>
+        </p:nvSpPr>
+        <p:spPr/>
+        <p:txBody>
+          <a:bodyPr/>
+          <a:lstStyle/>
+          <a:p>
+            <a:fld id="{01433A5C-A324-44F3-9AD9-9CE9975D1B38}" type="slidenum">
+              <a:rPr lang="en-US" smtClean="0"/>
+              <a:t>19</a:t>
             </a:fld>
             <a:endParaRPr lang="en-US"/>
           </a:p>
@@ -5429,115 +5317,6 @@
   <p:clrMapOvr>
     <a:masterClrMapping/>
   </p:clrMapOvr>
-  <p:timing>
-    <p:tnLst>
-      <p:par>
-        <p:cTn id="1" dur="indefinite" restart="never" nodeType="tmRoot"/>
-      </p:par>
-    </p:tnLst>
-  </p:timing>
-</p:sld>
-</file>
-
-<file path=ppt/slides/slide19.xml><?xml version="1.0" encoding="utf-8"?>
-<p:sld xmlns:a="http://schemas.openxmlformats.org/drawingml/2006/main" xmlns:r="http://schemas.openxmlformats.org/officeDocument/2006/relationships" xmlns:p="http://schemas.openxmlformats.org/presentationml/2006/main">
-  <p:cSld>
-    <p:spTree>
-      <p:nvGrpSpPr>
-        <p:cNvPr id="1" name=""/>
-        <p:cNvGrpSpPr/>
-        <p:nvPr/>
-      </p:nvGrpSpPr>
-      <p:grpSpPr>
-        <a:xfrm>
-          <a:off x="0" y="0"/>
-          <a:ext cx="0" cy="0"/>
-          <a:chOff x="0" y="0"/>
-          <a:chExt cx="0" cy="0"/>
-        </a:xfrm>
-      </p:grpSpPr>
-      <p:sp>
-        <p:nvSpPr>
-          <p:cNvPr id="5" name="Title 4"/>
-          <p:cNvSpPr>
-            <a:spLocks noGrp="1"/>
-          </p:cNvSpPr>
-          <p:nvPr>
-            <p:ph type="ctrTitle"/>
-          </p:nvPr>
-        </p:nvSpPr>
-        <p:spPr/>
-        <p:txBody>
-          <a:bodyPr/>
-          <a:lstStyle/>
-          <a:p>
-            <a:r>
-              <a:rPr lang="en-US" smtClean="0"/>
-              <a:t>Thank You!</a:t>
-            </a:r>
-            <a:endParaRPr lang="en-US"/>
-          </a:p>
-        </p:txBody>
-      </p:sp>
-      <p:sp>
-        <p:nvSpPr>
-          <p:cNvPr id="6" name="Subtitle 5"/>
-          <p:cNvSpPr>
-            <a:spLocks noGrp="1"/>
-          </p:cNvSpPr>
-          <p:nvPr>
-            <p:ph type="subTitle" idx="1"/>
-          </p:nvPr>
-        </p:nvSpPr>
-        <p:spPr/>
-        <p:txBody>
-          <a:bodyPr/>
-          <a:lstStyle/>
-          <a:p>
-            <a:endParaRPr lang="en-US"/>
-          </a:p>
-        </p:txBody>
-      </p:sp>
-      <p:sp>
-        <p:nvSpPr>
-          <p:cNvPr id="4" name="Slide Number Placeholder 3"/>
-          <p:cNvSpPr>
-            <a:spLocks noGrp="1"/>
-          </p:cNvSpPr>
-          <p:nvPr>
-            <p:ph type="sldNum" sz="quarter" idx="12"/>
-          </p:nvPr>
-        </p:nvSpPr>
-        <p:spPr/>
-        <p:txBody>
-          <a:bodyPr/>
-          <a:lstStyle/>
-          <a:p>
-            <a:fld id="{01433A5C-A324-44F3-9AD9-9CE9975D1B38}" type="slidenum">
-              <a:rPr lang="en-US" smtClean="0"/>
-              <a:t>19</a:t>
-            </a:fld>
-            <a:endParaRPr lang="en-US"/>
-          </a:p>
-        </p:txBody>
-      </p:sp>
-    </p:spTree>
-    <p:extLst>
-      <p:ext uri="{BB962C8B-B14F-4D97-AF65-F5344CB8AC3E}">
-        <p14:creationId xmlns:p14="http://schemas.microsoft.com/office/powerpoint/2010/main" val="3489270261"/>
-      </p:ext>
-    </p:extLst>
-  </p:cSld>
-  <p:clrMapOvr>
-    <a:masterClrMapping/>
-  </p:clrMapOvr>
-  <p:timing>
-    <p:tnLst>
-      <p:par>
-        <p:cTn id="1" dur="indefinite" restart="never" nodeType="tmRoot"/>
-      </p:par>
-    </p:tnLst>
-  </p:timing>
 </p:sld>
 </file>
 
@@ -5611,7 +5390,7 @@
               </a:spcBef>
             </a:pPr>
             <a:r>
-              <a:rPr lang="en-US" b="1" dirty="0" smtClean="0">
+              <a:rPr lang="en-US" b="1" dirty="0">
                 <a:solidFill>
                   <a:srgbClr val="0070C0"/>
                 </a:solidFill>
@@ -5619,24 +5398,8 @@
               <a:t>Cooperating process:</a:t>
             </a:r>
             <a:r>
-              <a:rPr lang="en-US" dirty="0" smtClean="0"/>
-              <a:t> </a:t>
-            </a:r>
-            <a:r>
-              <a:rPr lang="en-US" dirty="0"/>
-              <a:t>is </a:t>
-            </a:r>
-            <a:r>
-              <a:rPr lang="en-US" dirty="0" smtClean="0"/>
-              <a:t>a process </a:t>
-            </a:r>
-            <a:r>
-              <a:rPr lang="en-US" dirty="0"/>
-              <a:t>that can affect or be affected by other processes executing in the system</a:t>
-            </a:r>
-            <a:r>
-              <a:rPr lang="en-US" dirty="0" smtClean="0"/>
-              <a:t>.</a:t>
+              <a:rPr lang="en-US" dirty="0"/>
+              <a:t> is a process that can affect or be affected by other processes executing in the system.</a:t>
             </a:r>
           </a:p>
           <a:p>
@@ -5665,20 +5428,12 @@
               <a:t> or </a:t>
             </a:r>
             <a:r>
-              <a:rPr lang="en-US" b="1" i="1" dirty="0" smtClean="0">
-                <a:solidFill>
-                  <a:srgbClr val="C00000"/>
-                </a:solidFill>
-              </a:rPr>
-              <a:t>share data only </a:t>
-            </a:r>
-            <a:r>
               <a:rPr lang="en-US" b="1" i="1" dirty="0">
                 <a:solidFill>
                   <a:srgbClr val="C00000"/>
                 </a:solidFill>
               </a:rPr>
-              <a:t>through files or messages</a:t>
+              <a:t>share data only through files or messages</a:t>
             </a:r>
             <a:r>
               <a:rPr lang="en-US" dirty="0"/>
@@ -5696,19 +5451,7 @@
             </a:pPr>
             <a:r>
               <a:rPr lang="en-US" dirty="0"/>
-              <a:t>In this topic, </a:t>
-            </a:r>
-            <a:r>
-              <a:rPr lang="en-US" dirty="0" smtClean="0"/>
-              <a:t>we will </a:t>
-            </a:r>
-            <a:r>
-              <a:rPr lang="en-US" dirty="0"/>
-              <a:t>discuss various mechanisms to ensure orderly execution of cooperating processes, so that data consistency is maintained</a:t>
-            </a:r>
-            <a:r>
-              <a:rPr lang="en-US" dirty="0" smtClean="0"/>
-              <a:t>.</a:t>
+              <a:t>In this topic, we will discuss various mechanisms to ensure orderly execution of cooperating processes, so that data consistency is maintained.</a:t>
             </a:r>
           </a:p>
           <a:p>
@@ -5721,12 +5464,8 @@
               </a:spcBef>
             </a:pPr>
             <a:r>
-              <a:rPr lang="en-US" dirty="0" smtClean="0"/>
-              <a:t>For example, concurrent </a:t>
-            </a:r>
-            <a:r>
-              <a:rPr lang="en-US" dirty="0"/>
-              <a:t>access to shared data may result in data inconsistency.</a:t>
+              <a:rPr lang="en-US" dirty="0"/>
+              <a:t>For example, concurrent access to shared data may result in data inconsistency.</a:t>
             </a:r>
           </a:p>
         </p:txBody>
@@ -5758,6 +5497,100 @@
     <p:extLst>
       <p:ext uri="{BB962C8B-B14F-4D97-AF65-F5344CB8AC3E}">
         <p14:creationId xmlns:p14="http://schemas.microsoft.com/office/powerpoint/2010/main" val="3425873412"/>
+      </p:ext>
+    </p:extLst>
+  </p:cSld>
+  <p:clrMapOvr>
+    <a:masterClrMapping/>
+  </p:clrMapOvr>
+</p:sld>
+</file>
+
+<file path=ppt/slides/slide20.xml><?xml version="1.0" encoding="utf-8"?>
+<p:sld xmlns:a="http://schemas.openxmlformats.org/drawingml/2006/main" xmlns:r="http://schemas.openxmlformats.org/officeDocument/2006/relationships" xmlns:p="http://schemas.openxmlformats.org/presentationml/2006/main">
+  <p:cSld>
+    <p:spTree>
+      <p:nvGrpSpPr>
+        <p:cNvPr id="1" name=""/>
+        <p:cNvGrpSpPr/>
+        <p:nvPr/>
+      </p:nvGrpSpPr>
+      <p:grpSpPr>
+        <a:xfrm>
+          <a:off x="0" y="0"/>
+          <a:ext cx="0" cy="0"/>
+          <a:chOff x="0" y="0"/>
+          <a:chExt cx="0" cy="0"/>
+        </a:xfrm>
+      </p:grpSpPr>
+      <p:sp>
+        <p:nvSpPr>
+          <p:cNvPr id="5" name="Title 4"/>
+          <p:cNvSpPr>
+            <a:spLocks noGrp="1"/>
+          </p:cNvSpPr>
+          <p:nvPr>
+            <p:ph type="ctrTitle"/>
+          </p:nvPr>
+        </p:nvSpPr>
+        <p:spPr/>
+        <p:txBody>
+          <a:bodyPr/>
+          <a:lstStyle/>
+          <a:p>
+            <a:r>
+              <a:rPr lang="en-US"/>
+              <a:t>Thank You!</a:t>
+            </a:r>
+          </a:p>
+        </p:txBody>
+      </p:sp>
+      <p:sp>
+        <p:nvSpPr>
+          <p:cNvPr id="6" name="Subtitle 5"/>
+          <p:cNvSpPr>
+            <a:spLocks noGrp="1"/>
+          </p:cNvSpPr>
+          <p:nvPr>
+            <p:ph type="subTitle" idx="1"/>
+          </p:nvPr>
+        </p:nvSpPr>
+        <p:spPr/>
+        <p:txBody>
+          <a:bodyPr/>
+          <a:lstStyle/>
+          <a:p>
+            <a:endParaRPr lang="en-US"/>
+          </a:p>
+        </p:txBody>
+      </p:sp>
+      <p:sp>
+        <p:nvSpPr>
+          <p:cNvPr id="4" name="Slide Number Placeholder 3"/>
+          <p:cNvSpPr>
+            <a:spLocks noGrp="1"/>
+          </p:cNvSpPr>
+          <p:nvPr>
+            <p:ph type="sldNum" sz="quarter" idx="12"/>
+          </p:nvPr>
+        </p:nvSpPr>
+        <p:spPr/>
+        <p:txBody>
+          <a:bodyPr/>
+          <a:lstStyle/>
+          <a:p>
+            <a:fld id="{01433A5C-A324-44F3-9AD9-9CE9975D1B38}" type="slidenum">
+              <a:rPr lang="en-US" smtClean="0"/>
+              <a:t>20</a:t>
+            </a:fld>
+            <a:endParaRPr lang="en-US"/>
+          </a:p>
+        </p:txBody>
+      </p:sp>
+    </p:spTree>
+    <p:extLst>
+      <p:ext uri="{BB962C8B-B14F-4D97-AF65-F5344CB8AC3E}">
+        <p14:creationId xmlns:p14="http://schemas.microsoft.com/office/powerpoint/2010/main" val="3489270261"/>
       </p:ext>
     </p:extLst>
   </p:cSld>
@@ -5837,28 +5670,12 @@
               </a:spcBef>
             </a:pPr>
             <a:r>
-              <a:rPr lang="en-US" b="1" dirty="0" smtClean="0">
-                <a:solidFill>
-                  <a:srgbClr val="C00000"/>
-                </a:solidFill>
-              </a:rPr>
-              <a:t>Concurrency </a:t>
-            </a:r>
-            <a:r>
               <a:rPr lang="en-US" b="1" dirty="0">
                 <a:solidFill>
                   <a:srgbClr val="C00000"/>
                 </a:solidFill>
               </a:rPr>
-              <a:t>encompasses </a:t>
-            </a:r>
-            <a:r>
-              <a:rPr lang="en-US" b="1" dirty="0" smtClean="0">
-                <a:solidFill>
-                  <a:srgbClr val="C00000"/>
-                </a:solidFill>
-              </a:rPr>
-              <a:t>several design issues including:</a:t>
+              <a:t>Concurrency encompasses several design issues including:</a:t>
             </a:r>
           </a:p>
           <a:p>
@@ -5874,11 +5691,7 @@
             </a:pPr>
             <a:r>
               <a:rPr lang="en-US" sz="2600" dirty="0"/>
-              <a:t>Allocation of processor time to processes</a:t>
-            </a:r>
-            <a:r>
-              <a:rPr lang="en-US" sz="2600" dirty="0" smtClean="0"/>
-              <a:t>.</a:t>
+              <a:t>Allocation of processor time to processes.</a:t>
             </a:r>
           </a:p>
           <a:p>
@@ -5893,16 +5706,8 @@
               <a:buChar char="v"/>
             </a:pPr>
             <a:r>
-              <a:rPr lang="en-US" sz="2600" dirty="0" smtClean="0"/>
-              <a:t>Sharing of </a:t>
-            </a:r>
-            <a:r>
               <a:rPr lang="en-US" sz="2600" dirty="0"/>
-              <a:t>and competing for </a:t>
-            </a:r>
-            <a:r>
-              <a:rPr lang="en-US" sz="2600" dirty="0" smtClean="0"/>
-              <a:t>resources.</a:t>
+              <a:t>Sharing of and competing for resources.</a:t>
             </a:r>
           </a:p>
           <a:p>
@@ -5917,16 +5722,8 @@
               <a:buChar char="v"/>
             </a:pPr>
             <a:r>
-              <a:rPr lang="en-US" sz="2600" dirty="0" smtClean="0"/>
-              <a:t>Synchronization of </a:t>
-            </a:r>
-            <a:r>
               <a:rPr lang="en-US" sz="2600" dirty="0"/>
-              <a:t>multiple </a:t>
-            </a:r>
-            <a:r>
-              <a:rPr lang="en-US" sz="2600" dirty="0" smtClean="0"/>
-              <a:t>processes’ activities.</a:t>
+              <a:t>Synchronization of multiple processes’ activities.</a:t>
             </a:r>
           </a:p>
           <a:p>
@@ -5941,16 +5738,8 @@
               <a:buChar char="v"/>
             </a:pPr>
             <a:r>
-              <a:rPr lang="en-US" sz="2600" dirty="0" smtClean="0"/>
-              <a:t>Communication </a:t>
-            </a:r>
-            <a:r>
               <a:rPr lang="en-US" sz="2600" dirty="0"/>
-              <a:t>among processes</a:t>
-            </a:r>
-            <a:r>
-              <a:rPr lang="en-US" sz="2600" dirty="0" smtClean="0"/>
-              <a:t>.</a:t>
+              <a:t>Communication among processes.</a:t>
             </a:r>
           </a:p>
         </p:txBody>
@@ -6024,10 +5813,9 @@
           <a:lstStyle/>
           <a:p>
             <a:r>
-              <a:rPr lang="en-US" dirty="0" smtClean="0"/>
+              <a:rPr lang="en-US" dirty="0"/>
               <a:t>Concurrency (Cont.)</a:t>
             </a:r>
-            <a:endParaRPr lang="en-US" dirty="0"/>
           </a:p>
         </p:txBody>
       </p:sp>
@@ -6077,7 +5865,7 @@
               <a:rPr lang="en-US" dirty="0"/>
               <a:t>.</a:t>
             </a:r>
-            <a:endParaRPr lang="en-US" b="1" dirty="0" smtClean="0">
+            <a:endParaRPr lang="en-US" b="1" dirty="0">
               <a:solidFill>
                 <a:srgbClr val="FF0000"/>
               </a:solidFill>
@@ -6093,7 +5881,7 @@
               </a:spcBef>
             </a:pPr>
             <a:r>
-              <a:rPr lang="en-US" b="1" dirty="0" smtClean="0">
+              <a:rPr lang="en-US" b="1" dirty="0">
                 <a:solidFill>
                   <a:srgbClr val="FF0000"/>
                 </a:solidFill>
@@ -6101,12 +5889,8 @@
               <a:t>Mutual Exclusion:</a:t>
             </a:r>
             <a:r>
-              <a:rPr lang="en-US" dirty="0" smtClean="0"/>
-              <a:t> a requirement </a:t>
-            </a:r>
-            <a:r>
-              <a:rPr lang="en-US" dirty="0"/>
-              <a:t>that when one process is in a </a:t>
+              <a:rPr lang="en-US" dirty="0"/>
+              <a:t> a requirement that when one process is in a </a:t>
             </a:r>
             <a:r>
               <a:rPr lang="en-US" b="1" dirty="0">
@@ -6148,27 +5932,11 @@
                   <a:srgbClr val="FF0000"/>
                 </a:solidFill>
               </a:rPr>
-              <a:t>Critical </a:t>
-            </a:r>
-            <a:r>
-              <a:rPr lang="en-US" b="1" dirty="0" smtClean="0">
-                <a:solidFill>
-                  <a:srgbClr val="FF0000"/>
-                </a:solidFill>
-              </a:rPr>
-              <a:t>section:</a:t>
-            </a:r>
-            <a:r>
-              <a:rPr lang="en-US" dirty="0" smtClean="0"/>
-              <a:t> a </a:t>
-            </a:r>
-            <a:r>
-              <a:rPr lang="en-US" dirty="0"/>
-              <a:t>section of code within a process that requires access to shared resources and that must not be executed while another process is in a corresponding section of code</a:t>
-            </a:r>
-            <a:r>
-              <a:rPr lang="en-US" dirty="0" smtClean="0"/>
-              <a:t>.</a:t>
+              <a:t>Critical section:</a:t>
+            </a:r>
+            <a:r>
+              <a:rPr lang="en-US" dirty="0"/>
+              <a:t> a section of code within a process that requires access to shared resources and that must not be executed while another process is in a corresponding section of code.</a:t>
             </a:r>
           </a:p>
         </p:txBody>
@@ -6242,10 +6010,9 @@
           <a:lstStyle/>
           <a:p>
             <a:r>
-              <a:rPr lang="en-US" dirty="0" smtClean="0"/>
+              <a:rPr lang="en-US" dirty="0"/>
               <a:t>Principles of Concurrency</a:t>
             </a:r>
-            <a:endParaRPr lang="en-US" dirty="0"/>
           </a:p>
         </p:txBody>
       </p:sp>
@@ -6277,7 +6044,7 @@
               </a:lnSpc>
             </a:pPr>
             <a:r>
-              <a:rPr lang="en-US" b="1" dirty="0" smtClean="0">
+              <a:rPr lang="en-US" b="1" dirty="0">
                 <a:solidFill>
                   <a:srgbClr val="C00000"/>
                 </a:solidFill>
@@ -6298,31 +6065,7 @@
                   <a:srgbClr val="C00000"/>
                 </a:solidFill>
               </a:rPr>
-              <a:t> </a:t>
-            </a:r>
-            <a:r>
-              <a:rPr lang="en-US" b="1" dirty="0" smtClean="0">
-                <a:solidFill>
-                  <a:srgbClr val="C00000"/>
-                </a:solidFill>
-              </a:rPr>
-              <a:t>systems, the </a:t>
-            </a:r>
-            <a:r>
-              <a:rPr lang="en-US" b="1" dirty="0">
-                <a:solidFill>
-                  <a:srgbClr val="C00000"/>
-                </a:solidFill>
-              </a:rPr>
-              <a:t>following difficulties </a:t>
-            </a:r>
-            <a:r>
-              <a:rPr lang="en-US" b="1" dirty="0" smtClean="0">
-                <a:solidFill>
-                  <a:srgbClr val="C00000"/>
-                </a:solidFill>
-              </a:rPr>
-              <a:t>arise w.r.t. concurrency:</a:t>
+              <a:t> systems, the following difficulties arise w.r.t. concurrency:</a:t>
             </a:r>
           </a:p>
           <a:p>
@@ -6347,19 +6090,7 @@
             </a:r>
             <a:r>
               <a:rPr lang="en-US" dirty="0"/>
-              <a:t> is </a:t>
-            </a:r>
-            <a:r>
-              <a:rPr lang="en-US" dirty="0" smtClean="0"/>
-              <a:t>filled </a:t>
-            </a:r>
-            <a:r>
-              <a:rPr lang="en-US" dirty="0"/>
-              <a:t>with </a:t>
-            </a:r>
-            <a:r>
-              <a:rPr lang="en-US" dirty="0" smtClean="0"/>
-              <a:t>risk.</a:t>
+              <a:t> is filled with risk.</a:t>
             </a:r>
           </a:p>
           <a:p>
@@ -6372,19 +6103,7 @@
             </a:pPr>
             <a:r>
               <a:rPr lang="en-US" dirty="0"/>
-              <a:t>It is difficult for the OS to manage </a:t>
-            </a:r>
-            <a:r>
-              <a:rPr lang="en-US" dirty="0" smtClean="0"/>
-              <a:t>allocation </a:t>
-            </a:r>
-            <a:r>
-              <a:rPr lang="en-US" dirty="0"/>
-              <a:t>of resources </a:t>
-            </a:r>
-            <a:r>
-              <a:rPr lang="en-US" dirty="0" smtClean="0"/>
-              <a:t>optimally.</a:t>
+              <a:t>It is difficult for the OS to manage allocation of resources optimally.</a:t>
             </a:r>
           </a:p>
           <a:p>
@@ -6397,19 +6116,7 @@
             </a:pPr>
             <a:r>
               <a:rPr lang="en-US" dirty="0"/>
-              <a:t>It becomes very difficult to locate a programming error </a:t>
-            </a:r>
-            <a:r>
-              <a:rPr lang="en-US" dirty="0" smtClean="0"/>
-              <a:t>since </a:t>
-            </a:r>
-            <a:r>
-              <a:rPr lang="en-US" dirty="0"/>
-              <a:t>results are typically not deterministic and </a:t>
-            </a:r>
-            <a:r>
-              <a:rPr lang="en-US" dirty="0" smtClean="0"/>
-              <a:t>reproducible.</a:t>
+              <a:t>It becomes very difficult to locate a programming error since results are typically not deterministic and reproducible.</a:t>
             </a:r>
           </a:p>
           <a:p>
@@ -6432,15 +6139,7 @@
             </a:r>
             <a:r>
               <a:rPr lang="en-US" dirty="0"/>
-              <a:t> in a </a:t>
-            </a:r>
-            <a:r>
-              <a:rPr lang="en-US" dirty="0" smtClean="0"/>
-              <a:t>uniprocessor </a:t>
-            </a:r>
-            <a:r>
-              <a:rPr lang="en-US" dirty="0"/>
-              <a:t>multiprogramming system, and </a:t>
+              <a:t> in a uniprocessor multiprogramming system, and </a:t>
             </a:r>
             <a:r>
               <a:rPr lang="en-US" b="1" dirty="0">
@@ -6452,15 +6151,7 @@
             </a:r>
             <a:r>
               <a:rPr lang="en-US" dirty="0"/>
-              <a:t> in a </a:t>
-            </a:r>
-            <a:r>
-              <a:rPr lang="en-US" dirty="0" smtClean="0"/>
-              <a:t>multiprocessor </a:t>
-            </a:r>
-            <a:r>
-              <a:rPr lang="en-US" dirty="0"/>
-              <a:t>system, can be viewed as examples of concurrent processing.</a:t>
+              <a:t> in a multiprocessor system, can be viewed as examples of concurrent processing.</a:t>
             </a:r>
           </a:p>
           <a:p>
@@ -6530,29 +6221,13 @@
       </p:grpSpPr>
       <p:sp>
         <p:nvSpPr>
-          <p:cNvPr id="2" name="Title 1"/>
-          <p:cNvSpPr>
-            <a:spLocks noGrp="1"/>
-          </p:cNvSpPr>
-          <p:nvPr>
-            <p:ph type="title"/>
-          </p:nvPr>
-        </p:nvSpPr>
-        <p:spPr/>
-        <p:txBody>
-          <a:bodyPr/>
-          <a:lstStyle/>
-          <a:p>
-            <a:r>
-              <a:rPr lang="en-US" dirty="0"/>
-              <a:t>Race Condition</a:t>
-            </a:r>
-          </a:p>
-        </p:txBody>
-      </p:sp>
-      <p:sp>
-        <p:nvSpPr>
-          <p:cNvPr id="3" name="Content Placeholder 2"/>
+          <p:cNvPr id="3" name="Content Placeholder 2">
+            <a:extLst>
+              <a:ext uri="{FF2B5EF4-FFF2-40B4-BE49-F238E27FC236}">
+                <a16:creationId xmlns:a16="http://schemas.microsoft.com/office/drawing/2014/main" id="{F29ADC34-468E-AACD-09AB-DADD7B922440}"/>
+              </a:ext>
+            </a:extLst>
+          </p:cNvPr>
           <p:cNvSpPr>
             <a:spLocks noGrp="1"/>
           </p:cNvSpPr>
@@ -6562,8 +6237,8 @@
         </p:nvSpPr>
         <p:spPr>
           <a:xfrm>
-            <a:off x="838199" y="1825624"/>
-            <a:ext cx="10686143" cy="4763861"/>
+            <a:off x="838200" y="533400"/>
+            <a:ext cx="10515600" cy="6324600"/>
           </a:xfrm>
         </p:spPr>
         <p:txBody>
@@ -6572,218 +6247,84 @@
           </a:bodyPr>
           <a:lstStyle/>
           <a:p>
-            <a:pPr>
-              <a:lnSpc>
-                <a:spcPct val="110000"/>
-              </a:lnSpc>
-            </a:pPr>
-            <a:r>
-              <a:rPr lang="en-US" b="1" dirty="0" smtClean="0">
+            <a:r>
+              <a:rPr lang="en-GB" b="0" i="0" dirty="0">
                 <a:solidFill>
-                  <a:srgbClr val="FF0000"/>
+                  <a:srgbClr val="374151"/>
                 </a:solidFill>
+                <a:effectLst/>
+                <a:latin typeface="Söhne"/>
               </a:rPr>
-              <a:t>Race Condition:</a:t>
-            </a:r>
-            <a:r>
-              <a:rPr lang="en-US" dirty="0" smtClean="0"/>
-              <a:t> </a:t>
-            </a:r>
-            <a:r>
-              <a:rPr lang="en-US" dirty="0"/>
-              <a:t>occurs when multiple processes or threads read and write data items so that the final result depends on the order </a:t>
-            </a:r>
-            <a:r>
-              <a:rPr lang="en-US" dirty="0" smtClean="0"/>
-              <a:t>of </a:t>
-            </a:r>
-            <a:r>
-              <a:rPr lang="en-US" dirty="0"/>
-              <a:t>execution of instructions in </a:t>
-            </a:r>
-            <a:r>
-              <a:rPr lang="en-US" dirty="0" smtClean="0"/>
-              <a:t>the multiple </a:t>
-            </a:r>
-            <a:r>
-              <a:rPr lang="en-US" dirty="0"/>
-              <a:t>processes</a:t>
-            </a:r>
-            <a:r>
-              <a:rPr lang="en-US" dirty="0" smtClean="0"/>
-              <a:t>.</a:t>
-            </a:r>
-          </a:p>
-          <a:p>
-            <a:pPr marL="0" indent="0">
-              <a:lnSpc>
-                <a:spcPct val="110000"/>
-              </a:lnSpc>
-              <a:buNone/>
-            </a:pPr>
-            <a:r>
-              <a:rPr lang="en-US" b="1" u="sng" dirty="0" smtClean="0">
+              <a:t>Process interleaving is the execution of multiple processes or threads in an alternating manner, where each process or thread is given a small time slice to run before switching to another. This technique allows for better resource utilization and the illusion of simultaneous execution, improving multitasking and system performance.</a:t>
+            </a:r>
+          </a:p>
+          <a:p>
+            <a:r>
+              <a:rPr lang="en-GB" b="0" i="0" dirty="0">
                 <a:solidFill>
-                  <a:srgbClr val="C00000"/>
+                  <a:srgbClr val="202124"/>
                 </a:solidFill>
+                <a:effectLst/>
+                <a:latin typeface="Google Sans"/>
               </a:rPr>
-              <a:t>Example#01</a:t>
-            </a:r>
-            <a:r>
-              <a:rPr lang="en-US" b="1" dirty="0" smtClean="0">
+              <a:t>The process of development are overlapping as </a:t>
+            </a:r>
+            <a:r>
+              <a:rPr lang="en-GB" b="0" i="0" dirty="0">
                 <a:solidFill>
-                  <a:srgbClr val="C00000"/>
+                  <a:srgbClr val="040C28"/>
                 </a:solidFill>
+                <a:effectLst/>
+                <a:latin typeface="Google Sans"/>
               </a:rPr>
-              <a:t>:</a:t>
-            </a:r>
-          </a:p>
-          <a:p>
-            <a:pPr>
-              <a:lnSpc>
-                <a:spcPct val="110000"/>
-              </a:lnSpc>
-            </a:pPr>
-            <a:r>
-              <a:rPr lang="en-US" dirty="0" smtClean="0"/>
-              <a:t>Processes</a:t>
-            </a:r>
-            <a:r>
-              <a:rPr lang="en-US" dirty="0"/>
-              <a:t>, P1 and P2, share the </a:t>
-            </a:r>
-            <a:r>
-              <a:rPr lang="en-US" dirty="0" smtClean="0"/>
-              <a:t>global variable </a:t>
-            </a:r>
-            <a:r>
-              <a:rPr lang="en-US" b="1" dirty="0">
+              <a:t>the completion of a particular process is not defined</a:t>
+            </a:r>
+            <a:r>
+              <a:rPr lang="en-GB" b="0" i="0" dirty="0">
                 <a:solidFill>
-                  <a:srgbClr val="0070C0"/>
+                  <a:srgbClr val="202124"/>
                 </a:solidFill>
+                <a:effectLst/>
+                <a:latin typeface="Google Sans"/>
               </a:rPr>
-              <a:t>a</a:t>
-            </a:r>
-            <a:r>
-              <a:rPr lang="en-US" dirty="0" smtClean="0"/>
-              <a:t>.</a:t>
-            </a:r>
-          </a:p>
-          <a:p>
-            <a:pPr>
-              <a:lnSpc>
-                <a:spcPct val="110000"/>
-              </a:lnSpc>
-            </a:pPr>
-            <a:r>
-              <a:rPr lang="en-US" dirty="0"/>
-              <a:t>At some point </a:t>
-            </a:r>
-            <a:r>
-              <a:rPr lang="en-US" dirty="0" smtClean="0"/>
-              <a:t>of </a:t>
-            </a:r>
-            <a:r>
-              <a:rPr lang="en-US" dirty="0"/>
-              <a:t>execution, P1 updates </a:t>
-            </a:r>
-            <a:r>
-              <a:rPr lang="en-US" b="1" dirty="0">
+              <a:t>. The steps are progressive. Second may start when the first is still going on. Development involves four overlapping processes.</a:t>
+            </a:r>
+            <a:endParaRPr lang="en-GB" b="0" i="0" dirty="0">
+              <a:solidFill>
+                <a:srgbClr val="374151"/>
+              </a:solidFill>
+              <a:effectLst/>
+              <a:latin typeface="Söhne"/>
+            </a:endParaRPr>
+          </a:p>
+          <a:p>
+            <a:r>
+              <a:rPr lang="en-GB" b="0" i="0" dirty="0">
                 <a:solidFill>
-                  <a:srgbClr val="0070C0"/>
+                  <a:srgbClr val="202124"/>
                 </a:solidFill>
+                <a:effectLst/>
+                <a:latin typeface="Google Sans"/>
               </a:rPr>
-              <a:t>a</a:t>
-            </a:r>
-            <a:r>
-              <a:rPr lang="en-US" dirty="0" smtClean="0"/>
-              <a:t> </a:t>
-            </a:r>
-            <a:r>
-              <a:rPr lang="en-US" dirty="0"/>
-              <a:t>to the value 1, and at some point </a:t>
-            </a:r>
-            <a:r>
-              <a:rPr lang="en-US" dirty="0" smtClean="0"/>
-              <a:t>of </a:t>
-            </a:r>
-            <a:r>
-              <a:rPr lang="en-US" dirty="0"/>
-              <a:t>execution, P2 updates </a:t>
-            </a:r>
-            <a:r>
-              <a:rPr lang="en-US" b="1" dirty="0">
+              <a:t>Overlap processing overlaps time records. With overlap processing, a percentage of data from one time record is reused in the next time record.</a:t>
+            </a:r>
+            <a:endParaRPr lang="en-GB" dirty="0">
+              <a:solidFill>
+                <a:srgbClr val="374151"/>
+              </a:solidFill>
+              <a:latin typeface="Söhne"/>
+            </a:endParaRPr>
+          </a:p>
+          <a:p>
+            <a:r>
+              <a:rPr lang="en-GB" b="0" i="0" dirty="0">
                 <a:solidFill>
-                  <a:srgbClr val="0070C0"/>
+                  <a:srgbClr val="374151"/>
                 </a:solidFill>
+                <a:effectLst/>
+                <a:latin typeface="Söhne"/>
               </a:rPr>
-              <a:t>a</a:t>
-            </a:r>
-            <a:r>
-              <a:rPr lang="en-US" dirty="0" smtClean="0"/>
-              <a:t> </a:t>
-            </a:r>
-            <a:r>
-              <a:rPr lang="en-US" dirty="0"/>
-              <a:t>to the value 2</a:t>
-            </a:r>
-            <a:r>
-              <a:rPr lang="en-US" dirty="0" smtClean="0"/>
-              <a:t>.</a:t>
-            </a:r>
-          </a:p>
-          <a:p>
-            <a:pPr>
-              <a:lnSpc>
-                <a:spcPct val="110000"/>
-              </a:lnSpc>
-            </a:pPr>
-            <a:r>
-              <a:rPr lang="en-US" dirty="0"/>
-              <a:t>Thus, the two tasks are in a race to write </a:t>
-            </a:r>
-            <a:r>
-              <a:rPr lang="en-US" dirty="0" smtClean="0"/>
-              <a:t>variable </a:t>
-            </a:r>
-            <a:r>
-              <a:rPr lang="en-US" b="1" dirty="0">
-                <a:solidFill>
-                  <a:srgbClr val="0070C0"/>
-                </a:solidFill>
-              </a:rPr>
-              <a:t>a</a:t>
-            </a:r>
-            <a:r>
-              <a:rPr lang="en-US" dirty="0" smtClean="0"/>
-              <a:t>.</a:t>
-            </a:r>
-          </a:p>
-          <a:p>
-            <a:pPr>
-              <a:lnSpc>
-                <a:spcPct val="110000"/>
-              </a:lnSpc>
-            </a:pPr>
-            <a:r>
-              <a:rPr lang="en-US" dirty="0" smtClean="0"/>
-              <a:t>The </a:t>
-            </a:r>
-            <a:r>
-              <a:rPr lang="en-US" dirty="0"/>
-              <a:t>“loser” of the race (the process that updates last) determines the final value of </a:t>
-            </a:r>
-            <a:r>
-              <a:rPr lang="en-US" b="1" dirty="0">
-                <a:solidFill>
-                  <a:srgbClr val="0070C0"/>
-                </a:solidFill>
-              </a:rPr>
-              <a:t>a</a:t>
-            </a:r>
-            <a:r>
-              <a:rPr lang="en-US" dirty="0" smtClean="0"/>
-              <a:t>.</a:t>
+              <a:t>Processes overlapping refers to the simultaneous execution of multiple processes or threads. It involves running processes or threads concurrently, allowing them to progress simultaneously and potentially perform tasks in parallel. Overlapping processes can help maximize system resources and improve overall performance by taking advantage of available CPU and other resources.</a:t>
             </a:r>
             <a:endParaRPr lang="en-US" dirty="0"/>
           </a:p>
@@ -6791,7 +6332,13 @@
       </p:sp>
       <p:sp>
         <p:nvSpPr>
-          <p:cNvPr id="4" name="Slide Number Placeholder 3"/>
+          <p:cNvPr id="4" name="Slide Number Placeholder 3">
+            <a:extLst>
+              <a:ext uri="{FF2B5EF4-FFF2-40B4-BE49-F238E27FC236}">
+                <a16:creationId xmlns:a16="http://schemas.microsoft.com/office/drawing/2014/main" id="{CC49FCE0-AB52-E1D0-8ECB-53801AA5B2FC}"/>
+              </a:ext>
+            </a:extLst>
+          </p:cNvPr>
           <p:cNvSpPr>
             <a:spLocks noGrp="1"/>
           </p:cNvSpPr>
@@ -6815,20 +6362,13 @@
     </p:spTree>
     <p:extLst>
       <p:ext uri="{BB962C8B-B14F-4D97-AF65-F5344CB8AC3E}">
-        <p14:creationId xmlns:p14="http://schemas.microsoft.com/office/powerpoint/2010/main" val="3751605354"/>
+        <p14:creationId xmlns:p14="http://schemas.microsoft.com/office/powerpoint/2010/main" val="3171093462"/>
       </p:ext>
     </p:extLst>
   </p:cSld>
   <p:clrMapOvr>
     <a:masterClrMapping/>
   </p:clrMapOvr>
-  <p:timing>
-    <p:tnLst>
-      <p:par>
-        <p:cTn id="1" dur="indefinite" restart="never" nodeType="tmRoot"/>
-      </p:par>
-    </p:tnLst>
-  </p:timing>
 </p:sld>
 </file>
 
@@ -6866,13 +6406,8 @@
           <a:p>
             <a:r>
               <a:rPr lang="en-US" dirty="0"/>
-              <a:t>Race </a:t>
-            </a:r>
-            <a:r>
-              <a:rPr lang="en-US" dirty="0" smtClean="0"/>
-              <a:t>Condition (Cont.)</a:t>
-            </a:r>
-            <a:endParaRPr lang="en-US" dirty="0"/>
+              <a:t>Race Condition</a:t>
+            </a:r>
           </a:p>
         </p:txBody>
       </p:sp>
@@ -6889,28 +6424,50 @@
         <p:spPr>
           <a:xfrm>
             <a:off x="838199" y="1825624"/>
-            <a:ext cx="10686143" cy="4965975"/>
+            <a:ext cx="10686143" cy="4763861"/>
           </a:xfrm>
         </p:spPr>
         <p:txBody>
           <a:bodyPr>
-            <a:normAutofit/>
+            <a:normAutofit fontScale="92500" lnSpcReduction="10000"/>
           </a:bodyPr>
           <a:lstStyle/>
           <a:p>
+            <a:pPr>
+              <a:lnSpc>
+                <a:spcPct val="110000"/>
+              </a:lnSpc>
+            </a:pPr>
+            <a:r>
+              <a:rPr lang="en-US" b="1" dirty="0">
+                <a:solidFill>
+                  <a:srgbClr val="FF0000"/>
+                </a:solidFill>
+              </a:rPr>
+              <a:t>Race Condition:</a:t>
+            </a:r>
+            <a:r>
+              <a:rPr lang="en-US" dirty="0"/>
+              <a:t> occurs when multiple processes or threads read and write data items so that the final result depends on the order of execution of instructions in the multiple processes.</a:t>
+            </a:r>
+          </a:p>
+          <a:p>
             <a:pPr marL="0" indent="0">
+              <a:lnSpc>
+                <a:spcPct val="110000"/>
+              </a:lnSpc>
               <a:buNone/>
             </a:pPr>
             <a:r>
-              <a:rPr lang="en-US" b="1" u="sng" dirty="0" smtClean="0">
+              <a:rPr lang="en-US" b="1" u="sng" dirty="0">
                 <a:solidFill>
                   <a:srgbClr val="C00000"/>
                 </a:solidFill>
               </a:rPr>
-              <a:t>Example#02</a:t>
-            </a:r>
-            <a:r>
-              <a:rPr lang="en-US" b="1" dirty="0" smtClean="0">
+              <a:t>Example#01</a:t>
+            </a:r>
+            <a:r>
+              <a:rPr lang="en-US" b="1" dirty="0">
                 <a:solidFill>
                   <a:srgbClr val="C00000"/>
                 </a:solidFill>
@@ -6921,109 +6478,105 @@
           <a:p>
             <a:pPr>
               <a:lnSpc>
-                <a:spcPct val="100000"/>
+                <a:spcPct val="110000"/>
               </a:lnSpc>
             </a:pPr>
             <a:r>
               <a:rPr lang="en-US" dirty="0"/>
-              <a:t>Processes, P3 and P4, that share global variables b and c, with initial values b = 1 and c = 2</a:t>
-            </a:r>
-            <a:r>
-              <a:rPr lang="en-US" dirty="0" smtClean="0"/>
+              <a:t>Processes, P1 and P2, share the global variable </a:t>
+            </a:r>
+            <a:r>
+              <a:rPr lang="en-US" b="1" dirty="0">
+                <a:solidFill>
+                  <a:srgbClr val="0070C0"/>
+                </a:solidFill>
+              </a:rPr>
+              <a:t>a</a:t>
+            </a:r>
+            <a:r>
+              <a:rPr lang="en-US" dirty="0"/>
               <a:t>.</a:t>
             </a:r>
           </a:p>
           <a:p>
             <a:pPr>
               <a:lnSpc>
-                <a:spcPct val="100000"/>
+                <a:spcPct val="110000"/>
               </a:lnSpc>
             </a:pPr>
             <a:r>
               <a:rPr lang="en-US" dirty="0"/>
-              <a:t>At some point </a:t>
-            </a:r>
-            <a:r>
-              <a:rPr lang="en-US" dirty="0" smtClean="0"/>
-              <a:t>of execution</a:t>
-            </a:r>
-            <a:r>
-              <a:rPr lang="en-US" dirty="0"/>
-              <a:t>, P3 executes the assignment b = b + c, </a:t>
-            </a:r>
-            <a:r>
-              <a:rPr lang="en-US" dirty="0" smtClean="0"/>
-              <a:t>while </a:t>
-            </a:r>
-            <a:r>
-              <a:rPr lang="en-US" dirty="0"/>
-              <a:t>P4 executes the assignment c = b + c</a:t>
-            </a:r>
-            <a:r>
-              <a:rPr lang="en-US" dirty="0" smtClean="0"/>
-              <a:t>.</a:t>
+              <a:t>At some point of execution, P1 updates </a:t>
+            </a:r>
+            <a:r>
+              <a:rPr lang="en-US" b="1" dirty="0">
+                <a:solidFill>
+                  <a:srgbClr val="0070C0"/>
+                </a:solidFill>
+              </a:rPr>
+              <a:t>a</a:t>
+            </a:r>
+            <a:r>
+              <a:rPr lang="en-US" dirty="0"/>
+              <a:t> to the value 1, and at some point of execution, P2 updates </a:t>
+            </a:r>
+            <a:r>
+              <a:rPr lang="en-US" b="1" dirty="0">
+                <a:solidFill>
+                  <a:srgbClr val="0070C0"/>
+                </a:solidFill>
+              </a:rPr>
+              <a:t>a</a:t>
+            </a:r>
+            <a:r>
+              <a:rPr lang="en-US" dirty="0"/>
+              <a:t> to the value 2.</a:t>
             </a:r>
           </a:p>
           <a:p>
             <a:pPr>
               <a:lnSpc>
-                <a:spcPct val="100000"/>
+                <a:spcPct val="110000"/>
               </a:lnSpc>
             </a:pPr>
             <a:r>
-              <a:rPr lang="en-US" dirty="0" smtClean="0"/>
-              <a:t>The </a:t>
-            </a:r>
-            <a:r>
-              <a:rPr lang="en-US" dirty="0"/>
-              <a:t>final values of the two variables depend on the order in which the two processes execute these two assignments</a:t>
-            </a:r>
-            <a:r>
-              <a:rPr lang="en-US" dirty="0" smtClean="0"/>
+              <a:rPr lang="en-US" dirty="0"/>
+              <a:t>Thus, the two tasks are in a race to write variable </a:t>
+            </a:r>
+            <a:r>
+              <a:rPr lang="en-US" b="1" dirty="0">
+                <a:solidFill>
+                  <a:srgbClr val="0070C0"/>
+                </a:solidFill>
+              </a:rPr>
+              <a:t>a</a:t>
+            </a:r>
+            <a:r>
+              <a:rPr lang="en-US" dirty="0"/>
               <a:t>.</a:t>
             </a:r>
           </a:p>
           <a:p>
             <a:pPr>
               <a:lnSpc>
-                <a:spcPct val="100000"/>
+                <a:spcPct val="110000"/>
               </a:lnSpc>
             </a:pPr>
             <a:r>
               <a:rPr lang="en-US" dirty="0"/>
-              <a:t>If P3 executes </a:t>
-            </a:r>
-            <a:r>
-              <a:rPr lang="en-US" dirty="0" smtClean="0"/>
-              <a:t>first</a:t>
-            </a:r>
-            <a:r>
-              <a:rPr lang="en-US" dirty="0"/>
-              <a:t>, then the final values are b = 3 and c = 5. </a:t>
-            </a:r>
-            <a:endParaRPr lang="en-US" dirty="0" smtClean="0"/>
-          </a:p>
-          <a:p>
-            <a:pPr>
-              <a:lnSpc>
-                <a:spcPct val="100000"/>
-              </a:lnSpc>
-            </a:pPr>
-            <a:r>
-              <a:rPr lang="en-US" dirty="0" smtClean="0"/>
-              <a:t>If </a:t>
-            </a:r>
-            <a:r>
-              <a:rPr lang="en-US" dirty="0"/>
-              <a:t>P4 executes </a:t>
-            </a:r>
-            <a:r>
-              <a:rPr lang="en-US" dirty="0" smtClean="0"/>
-              <a:t>first</a:t>
-            </a:r>
-            <a:r>
-              <a:rPr lang="en-US" dirty="0"/>
-              <a:t>, then the final values are b = 4 and c = 3.</a:t>
+              <a:t>The “loser” of the race (the process that updates last) determines the final value of </a:t>
+            </a:r>
+            <a:r>
+              <a:rPr lang="en-US" b="1" dirty="0">
+                <a:solidFill>
+                  <a:srgbClr val="0070C0"/>
+                </a:solidFill>
+              </a:rPr>
+              <a:t>a</a:t>
+            </a:r>
+            <a:r>
+              <a:rPr lang="en-US" dirty="0"/>
+              <a:t>.</a:t>
             </a:r>
           </a:p>
         </p:txBody>
@@ -7054,20 +6607,13 @@
     </p:spTree>
     <p:extLst>
       <p:ext uri="{BB962C8B-B14F-4D97-AF65-F5344CB8AC3E}">
-        <p14:creationId xmlns:p14="http://schemas.microsoft.com/office/powerpoint/2010/main" val="947324714"/>
+        <p14:creationId xmlns:p14="http://schemas.microsoft.com/office/powerpoint/2010/main" val="3751605354"/>
       </p:ext>
     </p:extLst>
   </p:cSld>
   <p:clrMapOvr>
     <a:masterClrMapping/>
   </p:clrMapOvr>
-  <p:timing>
-    <p:tnLst>
-      <p:par>
-        <p:cTn id="1" dur="indefinite" restart="never" nodeType="tmRoot"/>
-      </p:par>
-    </p:tnLst>
-  </p:timing>
 </p:sld>
 </file>
 
@@ -7105,7 +6651,7 @@
           <a:p>
             <a:r>
               <a:rPr lang="en-US" dirty="0"/>
-              <a:t>Process Interaction</a:t>
+              <a:t>Race Condition (Cont.)</a:t>
             </a:r>
           </a:p>
         </p:txBody>
@@ -7123,28 +6669,25 @@
         <p:spPr>
           <a:xfrm>
             <a:off x="838199" y="1825624"/>
-            <a:ext cx="10715171" cy="4473576"/>
+            <a:ext cx="10686143" cy="4965975"/>
           </a:xfrm>
         </p:spPr>
         <p:txBody>
           <a:bodyPr>
-            <a:noAutofit/>
+            <a:normAutofit/>
           </a:bodyPr>
           <a:lstStyle/>
           <a:p>
             <a:pPr marL="0" indent="0">
-              <a:lnSpc>
-                <a:spcPct val="100000"/>
-              </a:lnSpc>
               <a:buNone/>
             </a:pPr>
             <a:r>
-              <a:rPr lang="en-US" b="1" dirty="0" smtClean="0">
+              <a:rPr lang="en-US" b="1" u="sng" dirty="0">
                 <a:solidFill>
                   <a:srgbClr val="C00000"/>
                 </a:solidFill>
               </a:rPr>
-              <a:t>Processes can be classified w.r.t. the degree </a:t>
+              <a:t>Example#02</a:t>
             </a:r>
             <a:r>
               <a:rPr lang="en-US" b="1" dirty="0">
@@ -7152,105 +6695,62 @@
                   <a:srgbClr val="C00000"/>
                 </a:solidFill>
               </a:rPr>
-              <a:t>to which they are aware of each other’s </a:t>
-            </a:r>
-            <a:r>
-              <a:rPr lang="en-US" b="1" dirty="0" smtClean="0">
-                <a:solidFill>
-                  <a:srgbClr val="C00000"/>
-                </a:solidFill>
-              </a:rPr>
-              <a:t>existence:</a:t>
-            </a:r>
-          </a:p>
-          <a:p>
-            <a:pPr marL="514350" indent="-514350">
-              <a:lnSpc>
-                <a:spcPct val="100000"/>
-              </a:lnSpc>
-              <a:buFont typeface="+mj-lt"/>
-              <a:buAutoNum type="arabicPeriod"/>
-            </a:pPr>
-            <a:r>
-              <a:rPr lang="en-US" b="1" dirty="0">
-                <a:solidFill>
-                  <a:srgbClr val="0070C0"/>
-                </a:solidFill>
-              </a:rPr>
-              <a:t>Processes unaware of each </a:t>
-            </a:r>
-            <a:r>
-              <a:rPr lang="en-US" b="1" dirty="0" smtClean="0">
-                <a:solidFill>
-                  <a:srgbClr val="0070C0"/>
-                </a:solidFill>
-              </a:rPr>
-              <a:t>other</a:t>
-            </a:r>
-          </a:p>
-          <a:p>
-            <a:pPr lvl="1">
+              <a:t>:</a:t>
+            </a:r>
+          </a:p>
+          <a:p>
+            <a:pPr>
               <a:lnSpc>
                 <a:spcPct val="100000"/>
               </a:lnSpc>
             </a:pPr>
             <a:r>
-              <a:rPr lang="en-US" sz="2600" dirty="0" smtClean="0"/>
-              <a:t>Independent </a:t>
-            </a:r>
-            <a:r>
-              <a:rPr lang="en-US" sz="2600" dirty="0"/>
-              <a:t>processes that are not intended to work together</a:t>
-            </a:r>
-            <a:r>
-              <a:rPr lang="en-US" sz="2600" dirty="0" smtClean="0"/>
-              <a:t>. </a:t>
-            </a:r>
-          </a:p>
-          <a:p>
-            <a:pPr lvl="1">
+              <a:rPr lang="en-US" dirty="0"/>
+              <a:t>Processes, P3 and P4, that share global variables b and c, with initial values b = 1 and c = 2.</a:t>
+            </a:r>
+          </a:p>
+          <a:p>
+            <a:pPr>
               <a:lnSpc>
                 <a:spcPct val="100000"/>
               </a:lnSpc>
             </a:pPr>
             <a:r>
-              <a:rPr lang="en-US" sz="2600" dirty="0"/>
-              <a:t>OS needs to be concerned about </a:t>
-            </a:r>
-            <a:r>
-              <a:rPr lang="en-US" sz="2600" b="1" dirty="0">
-                <a:solidFill>
-                  <a:srgbClr val="0070C0"/>
-                </a:solidFill>
-              </a:rPr>
-              <a:t>competition</a:t>
-            </a:r>
-            <a:r>
-              <a:rPr lang="en-US" sz="2600" dirty="0"/>
-              <a:t> for </a:t>
-            </a:r>
-            <a:r>
-              <a:rPr lang="en-US" sz="2600" dirty="0" smtClean="0"/>
-              <a:t>resources.</a:t>
-            </a:r>
-          </a:p>
-          <a:p>
-            <a:pPr lvl="1">
+              <a:rPr lang="en-US" dirty="0"/>
+              <a:t>At some point of execution, P3 executes the assignment b = b + c, while P4 executes the assignment c = b + c.</a:t>
+            </a:r>
+          </a:p>
+          <a:p>
+            <a:pPr>
               <a:lnSpc>
                 <a:spcPct val="100000"/>
               </a:lnSpc>
             </a:pPr>
             <a:r>
-              <a:rPr lang="en-US" sz="2600" dirty="0" smtClean="0"/>
-              <a:t>OS </a:t>
-            </a:r>
-            <a:r>
-              <a:rPr lang="en-US" sz="2600" dirty="0"/>
-              <a:t>must regulate the access to common </a:t>
-            </a:r>
-            <a:r>
-              <a:rPr lang="en-US" sz="2600" dirty="0" smtClean="0"/>
-              <a:t>resources.</a:t>
+              <a:rPr lang="en-US" dirty="0"/>
+              <a:t>The final values of the two variables depend on the order in which the two processes execute these two assignments.</a:t>
+            </a:r>
+          </a:p>
+          <a:p>
+            <a:pPr>
+              <a:lnSpc>
+                <a:spcPct val="100000"/>
+              </a:lnSpc>
+            </a:pPr>
+            <a:r>
+              <a:rPr lang="en-US" dirty="0"/>
+              <a:t>If P3 executes first, then the final values are b = 3 and c = 5. </a:t>
+            </a:r>
+          </a:p>
+          <a:p>
+            <a:pPr>
+              <a:lnSpc>
+                <a:spcPct val="100000"/>
+              </a:lnSpc>
+            </a:pPr>
+            <a:r>
+              <a:rPr lang="en-US" dirty="0"/>
+              <a:t>If P4 executes first, then the final values are b = 4 and c = 3.</a:t>
             </a:r>
           </a:p>
         </p:txBody>
@@ -7281,20 +6781,13 @@
     </p:spTree>
     <p:extLst>
       <p:ext uri="{BB962C8B-B14F-4D97-AF65-F5344CB8AC3E}">
-        <p14:creationId xmlns:p14="http://schemas.microsoft.com/office/powerpoint/2010/main" val="3942525540"/>
+        <p14:creationId xmlns:p14="http://schemas.microsoft.com/office/powerpoint/2010/main" val="947324714"/>
       </p:ext>
     </p:extLst>
   </p:cSld>
   <p:clrMapOvr>
     <a:masterClrMapping/>
   </p:clrMapOvr>
-  <p:timing>
-    <p:tnLst>
-      <p:par>
-        <p:cTn id="1" dur="indefinite" restart="never" nodeType="tmRoot"/>
-      </p:par>
-    </p:tnLst>
-  </p:timing>
 </p:sld>
 </file>
 
@@ -7332,13 +6825,8 @@
           <a:p>
             <a:r>
               <a:rPr lang="en-US" dirty="0"/>
-              <a:t>Process </a:t>
-            </a:r>
-            <a:r>
-              <a:rPr lang="en-US" dirty="0" smtClean="0"/>
-              <a:t>Interaction (Cont.)</a:t>
-            </a:r>
-            <a:endParaRPr lang="en-US" dirty="0"/>
+              <a:t>Process Interaction</a:t>
+            </a:r>
           </a:p>
         </p:txBody>
       </p:sp>
@@ -7354,22 +6842,38 @@
         </p:nvSpPr>
         <p:spPr>
           <a:xfrm>
-            <a:off x="838200" y="1825624"/>
-            <a:ext cx="10515600" cy="4792889"/>
+            <a:off x="838199" y="1825624"/>
+            <a:ext cx="10715171" cy="4473576"/>
           </a:xfrm>
         </p:spPr>
         <p:txBody>
           <a:bodyPr>
-            <a:normAutofit lnSpcReduction="10000"/>
+            <a:noAutofit/>
           </a:bodyPr>
           <a:lstStyle/>
+          <a:p>
+            <a:pPr marL="0" indent="0">
+              <a:lnSpc>
+                <a:spcPct val="100000"/>
+              </a:lnSpc>
+              <a:buNone/>
+            </a:pPr>
+            <a:r>
+              <a:rPr lang="en-US" b="1" dirty="0">
+                <a:solidFill>
+                  <a:srgbClr val="C00000"/>
+                </a:solidFill>
+              </a:rPr>
+              <a:t>Processes can be classified w.r.t. the degree to which they are aware of each other’s existence:</a:t>
+            </a:r>
+          </a:p>
           <a:p>
             <a:pPr marL="514350" indent="-514350">
               <a:lnSpc>
                 <a:spcPct val="100000"/>
               </a:lnSpc>
               <a:buFont typeface="+mj-lt"/>
-              <a:buAutoNum type="arabicPeriod" startAt="2"/>
+              <a:buAutoNum type="arabicPeriod"/>
             </a:pPr>
             <a:r>
               <a:rPr lang="en-US" b="1" dirty="0">
@@ -7377,17 +6881,8 @@
                   <a:srgbClr val="0070C0"/>
                 </a:solidFill>
               </a:rPr>
-              <a:t>Processes indirectly aware of each </a:t>
-            </a:r>
-            <a:r>
-              <a:rPr lang="en-US" b="1" dirty="0" smtClean="0">
-                <a:solidFill>
-                  <a:srgbClr val="0070C0"/>
-                </a:solidFill>
-              </a:rPr>
-              <a:t>other</a:t>
-            </a:r>
-            <a:endParaRPr lang="en-US" dirty="0"/>
+              <a:t>Processes unaware of each other</a:t>
+            </a:r>
           </a:p>
           <a:p>
             <a:pPr lvl="1">
@@ -7397,7 +6892,7 @@
             </a:pPr>
             <a:r>
               <a:rPr lang="en-US" sz="2600" dirty="0"/>
-              <a:t>Processes that are not necessarily aware of each other by their process IDs.</a:t>
+              <a:t>Independent processes that are not intended to work together. </a:t>
             </a:r>
           </a:p>
           <a:p>
@@ -7408,7 +6903,19 @@
             </a:pPr>
             <a:r>
               <a:rPr lang="en-US" sz="2600" dirty="0"/>
-              <a:t>Share access to some object, such as an I/O buffer. </a:t>
+              <a:t>OS needs to be concerned about </a:t>
+            </a:r>
+            <a:r>
+              <a:rPr lang="en-US" sz="2600" b="1" dirty="0">
+                <a:solidFill>
+                  <a:srgbClr val="0070C0"/>
+                </a:solidFill>
+              </a:rPr>
+              <a:t>competition</a:t>
+            </a:r>
+            <a:r>
+              <a:rPr lang="en-US" sz="2600" dirty="0"/>
+              <a:t> for resources.</a:t>
             </a:r>
           </a:p>
           <a:p>
@@ -7419,114 +6926,7 @@
             </a:pPr>
             <a:r>
               <a:rPr lang="en-US" sz="2600" dirty="0"/>
-              <a:t>Such processes exhibit </a:t>
-            </a:r>
-            <a:r>
-              <a:rPr lang="en-US" sz="2600" b="1" dirty="0">
-                <a:solidFill>
-                  <a:srgbClr val="0070C0"/>
-                </a:solidFill>
-              </a:rPr>
-              <a:t>cooperation</a:t>
-            </a:r>
-            <a:r>
-              <a:rPr lang="en-US" sz="2600" dirty="0"/>
-              <a:t> in sharing the common object.</a:t>
-            </a:r>
-            <a:endParaRPr lang="en-US" dirty="0"/>
-          </a:p>
-          <a:p>
-            <a:pPr marL="514350" indent="-514350">
-              <a:lnSpc>
-                <a:spcPct val="110000"/>
-              </a:lnSpc>
-              <a:buFont typeface="+mj-lt"/>
-              <a:buAutoNum type="arabicPeriod" startAt="2"/>
-            </a:pPr>
-            <a:r>
-              <a:rPr lang="en-US" b="1" dirty="0">
-                <a:solidFill>
-                  <a:srgbClr val="0070C0"/>
-                </a:solidFill>
-              </a:rPr>
-              <a:t>Processes directly aware of each </a:t>
-            </a:r>
-            <a:r>
-              <a:rPr lang="en-US" b="1" dirty="0" smtClean="0">
-                <a:solidFill>
-                  <a:srgbClr val="0070C0"/>
-                </a:solidFill>
-              </a:rPr>
-              <a:t>other</a:t>
-            </a:r>
-            <a:r>
-              <a:rPr lang="en-US" dirty="0" smtClean="0"/>
-              <a:t> </a:t>
-            </a:r>
-          </a:p>
-          <a:p>
-            <a:pPr lvl="1">
-              <a:lnSpc>
-                <a:spcPct val="110000"/>
-              </a:lnSpc>
-            </a:pPr>
-            <a:r>
-              <a:rPr lang="en-US" sz="2600" dirty="0" smtClean="0"/>
-              <a:t>Processes </a:t>
-            </a:r>
-            <a:r>
-              <a:rPr lang="en-US" sz="2600" dirty="0"/>
-              <a:t>that are able to communicate with each other by process </a:t>
-            </a:r>
-            <a:r>
-              <a:rPr lang="en-US" sz="2600" dirty="0" smtClean="0"/>
-              <a:t>ID.</a:t>
-            </a:r>
-          </a:p>
-          <a:p>
-            <a:pPr lvl="1">
-              <a:lnSpc>
-                <a:spcPct val="110000"/>
-              </a:lnSpc>
-            </a:pPr>
-            <a:r>
-              <a:rPr lang="en-US" sz="2600" dirty="0" smtClean="0"/>
-              <a:t>Designed </a:t>
-            </a:r>
-            <a:r>
-              <a:rPr lang="en-US" sz="2600" dirty="0"/>
-              <a:t>to work jointly on some activity</a:t>
-            </a:r>
-            <a:r>
-              <a:rPr lang="en-US" sz="2600" dirty="0" smtClean="0"/>
-              <a:t>.</a:t>
-            </a:r>
-          </a:p>
-          <a:p>
-            <a:pPr lvl="1">
-              <a:lnSpc>
-                <a:spcPct val="110000"/>
-              </a:lnSpc>
-            </a:pPr>
-            <a:r>
-              <a:rPr lang="en-US" sz="2600" dirty="0" smtClean="0"/>
-              <a:t>Such </a:t>
-            </a:r>
-            <a:r>
-              <a:rPr lang="en-US" sz="2600" dirty="0"/>
-              <a:t>processes exhibit </a:t>
-            </a:r>
-            <a:r>
-              <a:rPr lang="en-US" sz="2600" b="1" dirty="0">
-                <a:solidFill>
-                  <a:srgbClr val="0070C0"/>
-                </a:solidFill>
-              </a:rPr>
-              <a:t>cooperation</a:t>
-            </a:r>
-            <a:r>
-              <a:rPr lang="en-US" sz="2600" dirty="0"/>
-              <a:t>.</a:t>
+              <a:t>OS must regulate the access to common resources.</a:t>
             </a:r>
           </a:p>
         </p:txBody>
@@ -7557,20 +6957,13 @@
     </p:spTree>
     <p:extLst>
       <p:ext uri="{BB962C8B-B14F-4D97-AF65-F5344CB8AC3E}">
-        <p14:creationId xmlns:p14="http://schemas.microsoft.com/office/powerpoint/2010/main" val="3845189588"/>
+        <p14:creationId xmlns:p14="http://schemas.microsoft.com/office/powerpoint/2010/main" val="3942525540"/>
       </p:ext>
     </p:extLst>
   </p:cSld>
   <p:clrMapOvr>
     <a:masterClrMapping/>
   </p:clrMapOvr>
-  <p:timing>
-    <p:tnLst>
-      <p:par>
-        <p:cTn id="1" dur="indefinite" restart="never" nodeType="tmRoot"/>
-      </p:par>
-    </p:tnLst>
-  </p:timing>
 </p:sld>
 </file>
 

</xml_diff>